<commit_message>
Add lecture materials and update DHS 413 slides
Add course materials for CMP 412, CMP 414, and TMC 411 and update DHS 413 slide decks. Added: CMP 412/lecturenoteoncomputernetworkcommunication.zip, CMP 412/network01.docx, CMP 412/network02.docx, CMP 414/thread.docx, and TMC 411/TOTAL MAN CONCEPT Q26.docx. Modified: DHS 413/DHS 413 -STARTING Lecture1.pptx and DHS 413/DHS 413 -first Lecture1.pptx (updated slide content).
</commit_message>
<xml_diff>
--- a/DHS 413/DHS 413 -STARTING  Lecture1.pptx
+++ b/DHS 413/DHS 413 -STARTING  Lecture1.pptx
@@ -5,19 +5,19 @@
     <p:sldMasterId id="2147483648" r:id="rId1"/>
   </p:sldMasterIdLst>
   <p:sldIdLst>
-    <p:sldId id="256" r:id="rId2"/>
-    <p:sldId id="257" r:id="rId3"/>
-    <p:sldId id="258" r:id="rId4"/>
-    <p:sldId id="259" r:id="rId5"/>
-    <p:sldId id="260" r:id="rId6"/>
-    <p:sldId id="261" r:id="rId7"/>
-    <p:sldId id="262" r:id="rId8"/>
-    <p:sldId id="263" r:id="rId9"/>
-    <p:sldId id="276" r:id="rId10"/>
-    <p:sldId id="277" r:id="rId11"/>
-    <p:sldId id="273" r:id="rId12"/>
-    <p:sldId id="274" r:id="rId13"/>
-    <p:sldId id="275" r:id="rId14"/>
+    <p:sldId id="256" r:id="rId3"/>
+    <p:sldId id="257" r:id="rId4"/>
+    <p:sldId id="258" r:id="rId5"/>
+    <p:sldId id="259" r:id="rId6"/>
+    <p:sldId id="260" r:id="rId7"/>
+    <p:sldId id="261" r:id="rId8"/>
+    <p:sldId id="262" r:id="rId9"/>
+    <p:sldId id="263" r:id="rId10"/>
+    <p:sldId id="276" r:id="rId11"/>
+    <p:sldId id="277" r:id="rId12"/>
+    <p:sldId id="273" r:id="rId13"/>
+    <p:sldId id="274" r:id="rId14"/>
+    <p:sldId id="275" r:id="rId15"/>
   </p:sldIdLst>
   <p:sldSz cx="12192000" cy="6858000"/>
   <p:notesSz cx="6858000" cy="9144000"/>
@@ -118,7 +118,18 @@
   </p:defaultTextStyle>
   <p:extLst>
     <p:ext uri="{EFAFB233-063F-42B5-8137-9DF3F51BA10A}">
-      <p15:sldGuideLst xmlns:p15="http://schemas.microsoft.com/office/powerpoint/2012/main" xmlns=""/>
+      <p15:sldGuideLst xmlns:p15="http://schemas.microsoft.com/office/powerpoint/2012/main">
+        <p15:guide id="1" orient="horz" pos="2160" userDrawn="1">
+          <p15:clr>
+            <a:srgbClr val="A4A3A4"/>
+          </p15:clr>
+        </p15:guide>
+        <p15:guide id="2" pos="3840" userDrawn="1">
+          <p15:clr>
+            <a:srgbClr val="A4A3A4"/>
+          </p15:clr>
+        </p15:guide>
+      </p15:sldGuideLst>
     </p:ext>
   </p:extLst>
 </p:presentation>
@@ -312,8 +323,6 @@
           <a:p>
             <a:fld id="{B61BEF0D-F0BB-DE4B-95CE-6DB70DBA9567}" type="datetimeFigureOut">
               <a:rPr lang="en-US" dirty="0"/>
-              <a:pPr/>
-              <a:t>12/9/2025</a:t>
             </a:fld>
             <a:endParaRPr lang="en-US" dirty="0"/>
           </a:p>
@@ -442,8 +451,6 @@
           <a:p>
             <a:fld id="{D57F1E4F-1CFF-5643-939E-217C01CDF565}" type="slidenum">
               <a:rPr lang="en-US" dirty="0"/>
-              <a:pPr/>
-              <a:t>‹#›</a:t>
             </a:fld>
             <a:endParaRPr lang="en-US" dirty="0"/>
           </a:p>
@@ -627,6 +634,7 @@
               <a:rPr lang="en-US" smtClean="0"/>
               <a:t>Click to edit Master text styles</a:t>
             </a:r>
+            <a:endParaRPr lang="en-US" smtClean="0"/>
           </a:p>
         </p:txBody>
       </p:sp>
@@ -647,8 +655,6 @@
           <a:p>
             <a:fld id="{B61BEF0D-F0BB-DE4B-95CE-6DB70DBA9567}" type="datetimeFigureOut">
               <a:rPr lang="en-US" dirty="0"/>
-              <a:pPr/>
-              <a:t>12/9/2025</a:t>
             </a:fld>
             <a:endParaRPr lang="en-US" dirty="0"/>
           </a:p>
@@ -777,8 +783,6 @@
           <a:p>
             <a:fld id="{D57F1E4F-1CFF-5643-939E-217C01CDF565}" type="slidenum">
               <a:rPr lang="en-US" dirty="0"/>
-              <a:pPr/>
-              <a:t>‹#›</a:t>
             </a:fld>
             <a:endParaRPr lang="en-US" dirty="0"/>
           </a:p>
@@ -903,6 +907,7 @@
               <a:rPr lang="en-US" smtClean="0"/>
               <a:t>Click to edit Master text styles</a:t>
             </a:r>
+            <a:endParaRPr lang="en-US" smtClean="0"/>
           </a:p>
         </p:txBody>
       </p:sp>
@@ -1025,6 +1030,7 @@
               <a:rPr lang="en-US" smtClean="0"/>
               <a:t>Click to edit Master text styles</a:t>
             </a:r>
+            <a:endParaRPr lang="en-US" smtClean="0"/>
           </a:p>
         </p:txBody>
       </p:sp>
@@ -1045,8 +1051,6 @@
           <a:p>
             <a:fld id="{B61BEF0D-F0BB-DE4B-95CE-6DB70DBA9567}" type="datetimeFigureOut">
               <a:rPr lang="en-US" dirty="0"/>
-              <a:pPr/>
-              <a:t>12/9/2025</a:t>
             </a:fld>
             <a:endParaRPr lang="en-US" dirty="0"/>
           </a:p>
@@ -1175,8 +1179,6 @@
           <a:p>
             <a:fld id="{D57F1E4F-1CFF-5643-939E-217C01CDF565}" type="slidenum">
               <a:rPr lang="en-US" dirty="0"/>
-              <a:pPr/>
-              <a:t>‹#›</a:t>
             </a:fld>
             <a:endParaRPr lang="en-US" dirty="0"/>
           </a:p>
@@ -1213,10 +1215,20 @@
                   <a:schemeClr val="accent1"/>
                 </a:solidFill>
                 <a:effectLst/>
-                <a:latin typeface="Arial"/>
+                <a:latin typeface="Arial" panose="020B0604020202020204"/>
               </a:rPr>
               <a:t>“</a:t>
             </a:r>
+            <a:endParaRPr lang="en-US" sz="8000" baseline="0" dirty="0">
+              <a:ln w="3175" cmpd="sng">
+                <a:noFill/>
+              </a:ln>
+              <a:solidFill>
+                <a:schemeClr val="accent1"/>
+              </a:solidFill>
+              <a:effectLst/>
+              <a:latin typeface="Arial" panose="020B0604020202020204"/>
+            </a:endParaRPr>
           </a:p>
         </p:txBody>
       </p:sp>
@@ -1251,10 +1263,20 @@
                   <a:schemeClr val="accent1"/>
                 </a:solidFill>
                 <a:effectLst/>
-                <a:latin typeface="Arial"/>
+                <a:latin typeface="Arial" panose="020B0604020202020204"/>
               </a:rPr>
               <a:t>”</a:t>
             </a:r>
+            <a:endParaRPr lang="en-US" sz="8000" baseline="0" dirty="0">
+              <a:ln w="3175" cmpd="sng">
+                <a:noFill/>
+              </a:ln>
+              <a:solidFill>
+                <a:schemeClr val="accent1"/>
+              </a:solidFill>
+              <a:effectLst/>
+              <a:latin typeface="Arial" panose="020B0604020202020204"/>
+            </a:endParaRPr>
           </a:p>
         </p:txBody>
       </p:sp>
@@ -1358,6 +1380,7 @@
               <a:rPr lang="en-US" smtClean="0"/>
               <a:t>Click to edit Master text styles</a:t>
             </a:r>
+            <a:endParaRPr lang="en-US" smtClean="0"/>
           </a:p>
         </p:txBody>
       </p:sp>
@@ -1378,8 +1401,6 @@
           <a:p>
             <a:fld id="{B61BEF0D-F0BB-DE4B-95CE-6DB70DBA9567}" type="datetimeFigureOut">
               <a:rPr lang="en-US" dirty="0"/>
-              <a:pPr/>
-              <a:t>12/9/2025</a:t>
             </a:fld>
             <a:endParaRPr lang="en-US" dirty="0"/>
           </a:p>
@@ -1508,8 +1529,6 @@
           <a:p>
             <a:fld id="{D57F1E4F-1CFF-5643-939E-217C01CDF565}" type="slidenum">
               <a:rPr lang="en-US" dirty="0"/>
-              <a:pPr/>
-              <a:t>‹#›</a:t>
             </a:fld>
             <a:endParaRPr lang="en-US" dirty="0"/>
           </a:p>
@@ -1631,6 +1650,7 @@
               <a:rPr lang="en-US" smtClean="0"/>
               <a:t>Click to edit Master text styles</a:t>
             </a:r>
+            <a:endParaRPr lang="en-US" smtClean="0"/>
           </a:p>
         </p:txBody>
       </p:sp>
@@ -1675,6 +1695,7 @@
               <a:rPr lang="en-US" smtClean="0"/>
               <a:t>Click to edit Master text styles</a:t>
             </a:r>
+            <a:endParaRPr lang="en-US" smtClean="0"/>
           </a:p>
         </p:txBody>
       </p:sp>
@@ -1695,8 +1716,6 @@
           <a:p>
             <a:fld id="{B61BEF0D-F0BB-DE4B-95CE-6DB70DBA9567}" type="datetimeFigureOut">
               <a:rPr lang="en-US" dirty="0"/>
-              <a:pPr/>
-              <a:t>12/9/2025</a:t>
             </a:fld>
             <a:endParaRPr lang="en-US" dirty="0"/>
           </a:p>
@@ -1825,8 +1844,6 @@
           <a:p>
             <a:fld id="{D57F1E4F-1CFF-5643-939E-217C01CDF565}" type="slidenum">
               <a:rPr lang="en-US" dirty="0"/>
-              <a:pPr/>
-              <a:t>‹#›</a:t>
             </a:fld>
             <a:endParaRPr lang="en-US" dirty="0"/>
           </a:p>
@@ -1863,10 +1880,20 @@
                   <a:schemeClr val="accent1"/>
                 </a:solidFill>
                 <a:effectLst/>
-                <a:latin typeface="Arial"/>
+                <a:latin typeface="Arial" panose="020B0604020202020204"/>
               </a:rPr>
               <a:t>“</a:t>
             </a:r>
+            <a:endParaRPr lang="en-US" sz="8000" baseline="0" dirty="0">
+              <a:ln w="3175" cmpd="sng">
+                <a:noFill/>
+              </a:ln>
+              <a:solidFill>
+                <a:schemeClr val="accent1"/>
+              </a:solidFill>
+              <a:effectLst/>
+              <a:latin typeface="Arial" panose="020B0604020202020204"/>
+            </a:endParaRPr>
           </a:p>
         </p:txBody>
       </p:sp>
@@ -1901,10 +1928,20 @@
                   <a:schemeClr val="accent1"/>
                 </a:solidFill>
                 <a:effectLst/>
-                <a:latin typeface="Arial"/>
+                <a:latin typeface="Arial" panose="020B0604020202020204"/>
               </a:rPr>
               <a:t>”</a:t>
             </a:r>
+            <a:endParaRPr lang="en-US" sz="8000" baseline="0" dirty="0">
+              <a:ln w="3175" cmpd="sng">
+                <a:noFill/>
+              </a:ln>
+              <a:solidFill>
+                <a:schemeClr val="accent1"/>
+              </a:solidFill>
+              <a:effectLst/>
+              <a:latin typeface="Arial" panose="020B0604020202020204"/>
+            </a:endParaRPr>
           </a:p>
         </p:txBody>
       </p:sp>
@@ -2024,6 +2061,7 @@
               <a:rPr lang="en-US" smtClean="0"/>
               <a:t>Click to edit Master text styles</a:t>
             </a:r>
+            <a:endParaRPr lang="en-US" smtClean="0"/>
           </a:p>
         </p:txBody>
       </p:sp>
@@ -2068,6 +2106,7 @@
               <a:rPr lang="en-US" smtClean="0"/>
               <a:t>Click to edit Master text styles</a:t>
             </a:r>
+            <a:endParaRPr lang="en-US" smtClean="0"/>
           </a:p>
         </p:txBody>
       </p:sp>
@@ -2088,8 +2127,6 @@
           <a:p>
             <a:fld id="{B61BEF0D-F0BB-DE4B-95CE-6DB70DBA9567}" type="datetimeFigureOut">
               <a:rPr lang="en-US" dirty="0"/>
-              <a:pPr/>
-              <a:t>12/9/2025</a:t>
             </a:fld>
             <a:endParaRPr lang="en-US" dirty="0"/>
           </a:p>
@@ -2218,8 +2255,6 @@
           <a:p>
             <a:fld id="{D57F1E4F-1CFF-5643-939E-217C01CDF565}" type="slidenum">
               <a:rPr lang="en-US" dirty="0"/>
-              <a:pPr/>
-              <a:t>‹#›</a:t>
             </a:fld>
             <a:endParaRPr lang="en-US" dirty="0"/>
           </a:p>
@@ -2293,6 +2328,7 @@
               <a:rPr lang="en-US" smtClean="0"/>
               <a:t>Click to edit Master text styles</a:t>
             </a:r>
+            <a:endParaRPr lang="en-US" smtClean="0"/>
           </a:p>
           <a:p>
             <a:pPr lvl="1"/>
@@ -2300,6 +2336,7 @@
               <a:rPr lang="en-US" smtClean="0"/>
               <a:t>Second level</a:t>
             </a:r>
+            <a:endParaRPr lang="en-US" smtClean="0"/>
           </a:p>
           <a:p>
             <a:pPr lvl="2"/>
@@ -2307,6 +2344,7 @@
               <a:rPr lang="en-US" smtClean="0"/>
               <a:t>Third level</a:t>
             </a:r>
+            <a:endParaRPr lang="en-US" smtClean="0"/>
           </a:p>
           <a:p>
             <a:pPr lvl="3"/>
@@ -2314,6 +2352,7 @@
               <a:rPr lang="en-US" smtClean="0"/>
               <a:t>Fourth level</a:t>
             </a:r>
+            <a:endParaRPr lang="en-US" smtClean="0"/>
           </a:p>
           <a:p>
             <a:pPr lvl="4"/>
@@ -2342,8 +2381,6 @@
           <a:p>
             <a:fld id="{B61BEF0D-F0BB-DE4B-95CE-6DB70DBA9567}" type="datetimeFigureOut">
               <a:rPr lang="en-US" dirty="0"/>
-              <a:pPr/>
-              <a:t>12/9/2025</a:t>
             </a:fld>
             <a:endParaRPr lang="en-US" dirty="0"/>
           </a:p>
@@ -2467,8 +2504,6 @@
           <a:p>
             <a:fld id="{D57F1E4F-1CFF-5643-939E-217C01CDF565}" type="slidenum">
               <a:rPr lang="en-US" dirty="0"/>
-              <a:pPr/>
-              <a:t>‹#›</a:t>
             </a:fld>
             <a:endParaRPr lang="en-US" dirty="0"/>
           </a:p>
@@ -2552,6 +2587,7 @@
               <a:rPr lang="en-US" smtClean="0"/>
               <a:t>Click to edit Master text styles</a:t>
             </a:r>
+            <a:endParaRPr lang="en-US" smtClean="0"/>
           </a:p>
           <a:p>
             <a:pPr lvl="1"/>
@@ -2559,6 +2595,7 @@
               <a:rPr lang="en-US" smtClean="0"/>
               <a:t>Second level</a:t>
             </a:r>
+            <a:endParaRPr lang="en-US" smtClean="0"/>
           </a:p>
           <a:p>
             <a:pPr lvl="2"/>
@@ -2566,6 +2603,7 @@
               <a:rPr lang="en-US" smtClean="0"/>
               <a:t>Third level</a:t>
             </a:r>
+            <a:endParaRPr lang="en-US" smtClean="0"/>
           </a:p>
           <a:p>
             <a:pPr lvl="3"/>
@@ -2573,6 +2611,7 @@
               <a:rPr lang="en-US" smtClean="0"/>
               <a:t>Fourth level</a:t>
             </a:r>
+            <a:endParaRPr lang="en-US" smtClean="0"/>
           </a:p>
           <a:p>
             <a:pPr lvl="4"/>
@@ -2601,8 +2640,6 @@
           <a:p>
             <a:fld id="{B61BEF0D-F0BB-DE4B-95CE-6DB70DBA9567}" type="datetimeFigureOut">
               <a:rPr lang="en-US" dirty="0"/>
-              <a:pPr/>
-              <a:t>12/9/2025</a:t>
             </a:fld>
             <a:endParaRPr lang="en-US" dirty="0"/>
           </a:p>
@@ -2726,8 +2763,6 @@
           <a:p>
             <a:fld id="{D57F1E4F-1CFF-5643-939E-217C01CDF565}" type="slidenum">
               <a:rPr lang="en-US" dirty="0"/>
-              <a:pPr/>
-              <a:t>‹#›</a:t>
             </a:fld>
             <a:endParaRPr lang="en-US" dirty="0"/>
           </a:p>
@@ -2811,6 +2846,7 @@
               <a:rPr lang="en-US" smtClean="0"/>
               <a:t>Click to edit Master text styles</a:t>
             </a:r>
+            <a:endParaRPr lang="en-US" smtClean="0"/>
           </a:p>
           <a:p>
             <a:pPr lvl="1"/>
@@ -2818,6 +2854,7 @@
               <a:rPr lang="en-US" smtClean="0"/>
               <a:t>Second level</a:t>
             </a:r>
+            <a:endParaRPr lang="en-US" smtClean="0"/>
           </a:p>
           <a:p>
             <a:pPr lvl="2"/>
@@ -2825,6 +2862,7 @@
               <a:rPr lang="en-US" smtClean="0"/>
               <a:t>Third level</a:t>
             </a:r>
+            <a:endParaRPr lang="en-US" smtClean="0"/>
           </a:p>
           <a:p>
             <a:pPr lvl="3"/>
@@ -2832,6 +2870,7 @@
               <a:rPr lang="en-US" smtClean="0"/>
               <a:t>Fourth level</a:t>
             </a:r>
+            <a:endParaRPr lang="en-US" smtClean="0"/>
           </a:p>
           <a:p>
             <a:pPr lvl="4"/>
@@ -2860,8 +2899,6 @@
           <a:p>
             <a:fld id="{B61BEF0D-F0BB-DE4B-95CE-6DB70DBA9567}" type="datetimeFigureOut">
               <a:rPr lang="en-US" dirty="0"/>
-              <a:pPr/>
-              <a:t>12/9/2025</a:t>
             </a:fld>
             <a:endParaRPr lang="en-US" dirty="0"/>
           </a:p>
@@ -2985,8 +3022,6 @@
           <a:p>
             <a:fld id="{D57F1E4F-1CFF-5643-939E-217C01CDF565}" type="slidenum">
               <a:rPr lang="en-US" dirty="0"/>
-              <a:pPr/>
-              <a:t>‹#›</a:t>
             </a:fld>
             <a:endParaRPr lang="en-US" dirty="0"/>
           </a:p>
@@ -3166,6 +3201,7 @@
               <a:rPr lang="en-US" smtClean="0"/>
               <a:t>Click to edit Master text styles</a:t>
             </a:r>
+            <a:endParaRPr lang="en-US" smtClean="0"/>
           </a:p>
         </p:txBody>
       </p:sp>
@@ -3186,8 +3222,6 @@
           <a:p>
             <a:fld id="{B61BEF0D-F0BB-DE4B-95CE-6DB70DBA9567}" type="datetimeFigureOut">
               <a:rPr lang="en-US" dirty="0"/>
-              <a:pPr/>
-              <a:t>12/9/2025</a:t>
             </a:fld>
             <a:endParaRPr lang="en-US" dirty="0"/>
           </a:p>
@@ -3316,8 +3350,6 @@
           <a:p>
             <a:fld id="{D57F1E4F-1CFF-5643-939E-217C01CDF565}" type="slidenum">
               <a:rPr lang="en-US" dirty="0"/>
-              <a:pPr/>
-              <a:t>‹#›</a:t>
             </a:fld>
             <a:endParaRPr lang="en-US" dirty="0"/>
           </a:p>
@@ -3398,6 +3430,7 @@
               <a:rPr lang="en-US" smtClean="0"/>
               <a:t>Click to edit Master text styles</a:t>
             </a:r>
+            <a:endParaRPr lang="en-US" smtClean="0"/>
           </a:p>
           <a:p>
             <a:pPr lvl="1"/>
@@ -3405,6 +3438,7 @@
               <a:rPr lang="en-US" smtClean="0"/>
               <a:t>Second level</a:t>
             </a:r>
+            <a:endParaRPr lang="en-US" smtClean="0"/>
           </a:p>
           <a:p>
             <a:pPr lvl="2"/>
@@ -3412,6 +3446,7 @@
               <a:rPr lang="en-US" smtClean="0"/>
               <a:t>Third level</a:t>
             </a:r>
+            <a:endParaRPr lang="en-US" smtClean="0"/>
           </a:p>
           <a:p>
             <a:pPr lvl="3"/>
@@ -3419,6 +3454,7 @@
               <a:rPr lang="en-US" smtClean="0"/>
               <a:t>Fourth level</a:t>
             </a:r>
+            <a:endParaRPr lang="en-US" smtClean="0"/>
           </a:p>
           <a:p>
             <a:pPr lvl="4"/>
@@ -3457,6 +3493,7 @@
               <a:rPr lang="en-US" smtClean="0"/>
               <a:t>Click to edit Master text styles</a:t>
             </a:r>
+            <a:endParaRPr lang="en-US" smtClean="0"/>
           </a:p>
           <a:p>
             <a:pPr lvl="1"/>
@@ -3464,6 +3501,7 @@
               <a:rPr lang="en-US" smtClean="0"/>
               <a:t>Second level</a:t>
             </a:r>
+            <a:endParaRPr lang="en-US" smtClean="0"/>
           </a:p>
           <a:p>
             <a:pPr lvl="2"/>
@@ -3471,6 +3509,7 @@
               <a:rPr lang="en-US" smtClean="0"/>
               <a:t>Third level</a:t>
             </a:r>
+            <a:endParaRPr lang="en-US" smtClean="0"/>
           </a:p>
           <a:p>
             <a:pPr lvl="3"/>
@@ -3478,6 +3517,7 @@
               <a:rPr lang="en-US" smtClean="0"/>
               <a:t>Fourth level</a:t>
             </a:r>
+            <a:endParaRPr lang="en-US" smtClean="0"/>
           </a:p>
           <a:p>
             <a:pPr lvl="4"/>
@@ -3506,8 +3546,6 @@
           <a:p>
             <a:fld id="{B61BEF0D-F0BB-DE4B-95CE-6DB70DBA9567}" type="datetimeFigureOut">
               <a:rPr lang="en-US" dirty="0"/>
-              <a:pPr/>
-              <a:t>12/9/2025</a:t>
             </a:fld>
             <a:endParaRPr lang="en-US" dirty="0"/>
           </a:p>
@@ -3636,8 +3674,6 @@
           <a:p>
             <a:fld id="{D57F1E4F-1CFF-5643-939E-217C01CDF565}" type="slidenum">
               <a:rPr lang="en-US" dirty="0"/>
-              <a:pPr/>
-              <a:t>‹#›</a:t>
             </a:fld>
             <a:endParaRPr lang="en-US" dirty="0"/>
           </a:p>
@@ -3755,6 +3791,7 @@
               <a:rPr lang="en-US" smtClean="0"/>
               <a:t>Click to edit Master text styles</a:t>
             </a:r>
+            <a:endParaRPr lang="en-US" smtClean="0"/>
           </a:p>
         </p:txBody>
       </p:sp>
@@ -3785,6 +3822,7 @@
               <a:rPr lang="en-US" smtClean="0"/>
               <a:t>Click to edit Master text styles</a:t>
             </a:r>
+            <a:endParaRPr lang="en-US" smtClean="0"/>
           </a:p>
           <a:p>
             <a:pPr lvl="1"/>
@@ -3792,6 +3830,7 @@
               <a:rPr lang="en-US" smtClean="0"/>
               <a:t>Second level</a:t>
             </a:r>
+            <a:endParaRPr lang="en-US" smtClean="0"/>
           </a:p>
           <a:p>
             <a:pPr lvl="2"/>
@@ -3799,6 +3838,7 @@
               <a:rPr lang="en-US" smtClean="0"/>
               <a:t>Third level</a:t>
             </a:r>
+            <a:endParaRPr lang="en-US" smtClean="0"/>
           </a:p>
           <a:p>
             <a:pPr lvl="3"/>
@@ -3806,6 +3846,7 @@
               <a:rPr lang="en-US" smtClean="0"/>
               <a:t>Fourth level</a:t>
             </a:r>
+            <a:endParaRPr lang="en-US" smtClean="0"/>
           </a:p>
           <a:p>
             <a:pPr lvl="4"/>
@@ -3881,6 +3922,7 @@
               <a:rPr lang="en-US" smtClean="0"/>
               <a:t>Click to edit Master text styles</a:t>
             </a:r>
+            <a:endParaRPr lang="en-US" smtClean="0"/>
           </a:p>
         </p:txBody>
       </p:sp>
@@ -3911,6 +3953,7 @@
               <a:rPr lang="en-US" smtClean="0"/>
               <a:t>Click to edit Master text styles</a:t>
             </a:r>
+            <a:endParaRPr lang="en-US" smtClean="0"/>
           </a:p>
           <a:p>
             <a:pPr lvl="1"/>
@@ -3918,6 +3961,7 @@
               <a:rPr lang="en-US" smtClean="0"/>
               <a:t>Second level</a:t>
             </a:r>
+            <a:endParaRPr lang="en-US" smtClean="0"/>
           </a:p>
           <a:p>
             <a:pPr lvl="2"/>
@@ -3925,6 +3969,7 @@
               <a:rPr lang="en-US" smtClean="0"/>
               <a:t>Third level</a:t>
             </a:r>
+            <a:endParaRPr lang="en-US" smtClean="0"/>
           </a:p>
           <a:p>
             <a:pPr lvl="3"/>
@@ -3932,6 +3977,7 @@
               <a:rPr lang="en-US" smtClean="0"/>
               <a:t>Fourth level</a:t>
             </a:r>
+            <a:endParaRPr lang="en-US" smtClean="0"/>
           </a:p>
           <a:p>
             <a:pPr lvl="4"/>
@@ -3960,8 +4006,6 @@
           <a:p>
             <a:fld id="{B61BEF0D-F0BB-DE4B-95CE-6DB70DBA9567}" type="datetimeFigureOut">
               <a:rPr lang="en-US" dirty="0"/>
-              <a:pPr/>
-              <a:t>12/9/2025</a:t>
             </a:fld>
             <a:endParaRPr lang="en-US" dirty="0"/>
           </a:p>
@@ -4090,8 +4134,6 @@
           <a:p>
             <a:fld id="{D57F1E4F-1CFF-5643-939E-217C01CDF565}" type="slidenum">
               <a:rPr lang="en-US" dirty="0"/>
-              <a:pPr/>
-              <a:t>‹#›</a:t>
             </a:fld>
             <a:endParaRPr lang="en-US" dirty="0"/>
           </a:p>
@@ -4162,8 +4204,6 @@
           <a:p>
             <a:fld id="{B61BEF0D-F0BB-DE4B-95CE-6DB70DBA9567}" type="datetimeFigureOut">
               <a:rPr lang="en-US" dirty="0"/>
-              <a:pPr/>
-              <a:t>12/9/2025</a:t>
             </a:fld>
             <a:endParaRPr lang="en-US" dirty="0"/>
           </a:p>
@@ -4287,8 +4327,6 @@
           <a:p>
             <a:fld id="{D57F1E4F-1CFF-5643-939E-217C01CDF565}" type="slidenum">
               <a:rPr lang="en-US" dirty="0"/>
-              <a:pPr/>
-              <a:t>‹#›</a:t>
             </a:fld>
             <a:endParaRPr lang="en-US" dirty="0"/>
           </a:p>
@@ -4336,8 +4374,6 @@
           <a:p>
             <a:fld id="{B61BEF0D-F0BB-DE4B-95CE-6DB70DBA9567}" type="datetimeFigureOut">
               <a:rPr lang="en-US" dirty="0"/>
-              <a:pPr/>
-              <a:t>12/9/2025</a:t>
             </a:fld>
             <a:endParaRPr lang="en-US" dirty="0"/>
           </a:p>
@@ -4461,8 +4497,6 @@
           <a:p>
             <a:fld id="{D57F1E4F-1CFF-5643-939E-217C01CDF565}" type="slidenum">
               <a:rPr lang="en-US" dirty="0"/>
-              <a:pPr/>
-              <a:t>‹#›</a:t>
             </a:fld>
             <a:endParaRPr lang="en-US" dirty="0"/>
           </a:p>
@@ -4552,6 +4586,7 @@
               <a:rPr lang="en-US" smtClean="0"/>
               <a:t>Click to edit Master text styles</a:t>
             </a:r>
+            <a:endParaRPr lang="en-US" smtClean="0"/>
           </a:p>
           <a:p>
             <a:pPr lvl="1"/>
@@ -4559,6 +4594,7 @@
               <a:rPr lang="en-US" smtClean="0"/>
               <a:t>Second level</a:t>
             </a:r>
+            <a:endParaRPr lang="en-US" smtClean="0"/>
           </a:p>
           <a:p>
             <a:pPr lvl="2"/>
@@ -4566,6 +4602,7 @@
               <a:rPr lang="en-US" smtClean="0"/>
               <a:t>Third level</a:t>
             </a:r>
+            <a:endParaRPr lang="en-US" smtClean="0"/>
           </a:p>
           <a:p>
             <a:pPr lvl="3"/>
@@ -4573,6 +4610,7 @@
               <a:rPr lang="en-US" smtClean="0"/>
               <a:t>Fourth level</a:t>
             </a:r>
+            <a:endParaRPr lang="en-US" smtClean="0"/>
           </a:p>
           <a:p>
             <a:pPr lvl="4"/>
@@ -4646,6 +4684,7 @@
               <a:rPr lang="en-US" smtClean="0"/>
               <a:t>Click to edit Master text styles</a:t>
             </a:r>
+            <a:endParaRPr lang="en-US" smtClean="0"/>
           </a:p>
         </p:txBody>
       </p:sp>
@@ -4666,8 +4705,6 @@
           <a:p>
             <a:fld id="{B61BEF0D-F0BB-DE4B-95CE-6DB70DBA9567}" type="datetimeFigureOut">
               <a:rPr lang="en-US" dirty="0"/>
-              <a:pPr/>
-              <a:t>12/9/2025</a:t>
             </a:fld>
             <a:endParaRPr lang="en-US" dirty="0"/>
           </a:p>
@@ -4791,8 +4828,6 @@
           <a:p>
             <a:fld id="{D57F1E4F-1CFF-5643-939E-217C01CDF565}" type="slidenum">
               <a:rPr lang="en-US" dirty="0"/>
-              <a:pPr/>
-              <a:t>‹#›</a:t>
             </a:fld>
             <a:endParaRPr lang="en-US" dirty="0"/>
           </a:p>
@@ -4988,6 +5023,7 @@
               <a:rPr lang="en-US" smtClean="0"/>
               <a:t>Click to edit Master text styles</a:t>
             </a:r>
+            <a:endParaRPr lang="en-US" smtClean="0"/>
           </a:p>
         </p:txBody>
       </p:sp>
@@ -5008,8 +5044,6 @@
           <a:p>
             <a:fld id="{B61BEF0D-F0BB-DE4B-95CE-6DB70DBA9567}" type="datetimeFigureOut">
               <a:rPr lang="en-US" dirty="0"/>
-              <a:pPr/>
-              <a:t>12/9/2025</a:t>
             </a:fld>
             <a:endParaRPr lang="en-US" dirty="0"/>
           </a:p>
@@ -5138,8 +5172,6 @@
           <a:p>
             <a:fld id="{D57F1E4F-1CFF-5643-939E-217C01CDF565}" type="slidenum">
               <a:rPr lang="en-US" dirty="0"/>
-              <a:pPr/>
-              <a:t>‹#›</a:t>
             </a:fld>
             <a:endParaRPr lang="en-US" dirty="0"/>
           </a:p>
@@ -7055,6 +7087,7 @@
               <a:rPr lang="en-US" smtClean="0"/>
               <a:t>Click to edit Master text styles</a:t>
             </a:r>
+            <a:endParaRPr lang="en-US" smtClean="0"/>
           </a:p>
           <a:p>
             <a:pPr lvl="1"/>
@@ -7062,6 +7095,7 @@
               <a:rPr lang="en-US" smtClean="0"/>
               <a:t>Second level</a:t>
             </a:r>
+            <a:endParaRPr lang="en-US" smtClean="0"/>
           </a:p>
           <a:p>
             <a:pPr lvl="2"/>
@@ -7069,6 +7103,7 @@
               <a:rPr lang="en-US" smtClean="0"/>
               <a:t>Third level</a:t>
             </a:r>
+            <a:endParaRPr lang="en-US" smtClean="0"/>
           </a:p>
           <a:p>
             <a:pPr lvl="3"/>
@@ -7076,6 +7111,7 @@
               <a:rPr lang="en-US" smtClean="0"/>
               <a:t>Fourth level</a:t>
             </a:r>
+            <a:endParaRPr lang="en-US" smtClean="0"/>
           </a:p>
           <a:p>
             <a:pPr lvl="4"/>
@@ -7122,8 +7158,6 @@
           <a:p>
             <a:fld id="{B61BEF0D-F0BB-DE4B-95CE-6DB70DBA9567}" type="datetimeFigureOut">
               <a:rPr lang="en-US" dirty="0"/>
-              <a:pPr/>
-              <a:t>12/9/2025</a:t>
             </a:fld>
             <a:endParaRPr lang="en-US" dirty="0"/>
           </a:p>
@@ -7199,8 +7233,6 @@
           <a:p>
             <a:fld id="{D57F1E4F-1CFF-5643-939E-217C01CDF565}" type="slidenum">
               <a:rPr lang="en-US" dirty="0"/>
-              <a:pPr/>
-              <a:t>‹#›</a:t>
             </a:fld>
             <a:endParaRPr lang="en-US" dirty="0"/>
           </a:p>
@@ -7219,13 +7251,13 @@
     <p:sldLayoutId id="2147483655" r:id="rId7"/>
     <p:sldLayoutId id="2147483656" r:id="rId8"/>
     <p:sldLayoutId id="2147483657" r:id="rId9"/>
-    <p:sldLayoutId id="2147483660" r:id="rId10"/>
-    <p:sldLayoutId id="2147483661" r:id="rId11"/>
-    <p:sldLayoutId id="2147483662" r:id="rId12"/>
-    <p:sldLayoutId id="2147483663" r:id="rId13"/>
-    <p:sldLayoutId id="2147483664" r:id="rId14"/>
-    <p:sldLayoutId id="2147483658" r:id="rId15"/>
-    <p:sldLayoutId id="2147483659" r:id="rId16"/>
+    <p:sldLayoutId id="2147483658" r:id="rId10"/>
+    <p:sldLayoutId id="2147483659" r:id="rId11"/>
+    <p:sldLayoutId id="2147483660" r:id="rId12"/>
+    <p:sldLayoutId id="2147483661" r:id="rId13"/>
+    <p:sldLayoutId id="2147483662" r:id="rId14"/>
+    <p:sldLayoutId id="2147483663" r:id="rId15"/>
+    <p:sldLayoutId id="2147483664" r:id="rId16"/>
   </p:sldLayoutIdLst>
   <p:txStyles>
     <p:titleStyle>
@@ -7314,7 +7346,7 @@
         <a:buClr>
           <a:schemeClr val="accent1"/>
         </a:buClr>
-        <a:buFont typeface="Wingdings 3" charset="2"/>
+        <a:buFont typeface="Wingdings 3" panose="05040102010807070707" charset="2"/>
         <a:buChar char=""/>
         <a:defRPr sz="1800" kern="1200">
           <a:solidFill>
@@ -7338,7 +7370,7 @@
         <a:buClr>
           <a:schemeClr val="accent1"/>
         </a:buClr>
-        <a:buFont typeface="Wingdings 3" charset="2"/>
+        <a:buFont typeface="Wingdings 3" panose="05040102010807070707" charset="2"/>
         <a:buChar char=""/>
         <a:defRPr sz="1600" kern="1200">
           <a:solidFill>
@@ -7362,7 +7394,7 @@
         <a:buClr>
           <a:schemeClr val="accent1"/>
         </a:buClr>
-        <a:buFont typeface="Wingdings 3" charset="2"/>
+        <a:buFont typeface="Wingdings 3" panose="05040102010807070707" charset="2"/>
         <a:buChar char=""/>
         <a:defRPr sz="1400" kern="1200">
           <a:solidFill>
@@ -7386,7 +7418,7 @@
         <a:buClr>
           <a:schemeClr val="accent1"/>
         </a:buClr>
-        <a:buFont typeface="Wingdings 3" charset="2"/>
+        <a:buFont typeface="Wingdings 3" panose="05040102010807070707" charset="2"/>
         <a:buChar char=""/>
         <a:defRPr sz="1200" kern="1200">
           <a:solidFill>
@@ -7410,7 +7442,7 @@
         <a:buClr>
           <a:schemeClr val="accent1"/>
         </a:buClr>
-        <a:buFont typeface="Wingdings 3" charset="2"/>
+        <a:buFont typeface="Wingdings 3" panose="05040102010807070707" charset="2"/>
         <a:buChar char=""/>
         <a:defRPr sz="1200" kern="1200">
           <a:solidFill>
@@ -7434,7 +7466,7 @@
         <a:buClr>
           <a:schemeClr val="accent1"/>
         </a:buClr>
-        <a:buFont typeface="Wingdings 3" charset="2"/>
+        <a:buFont typeface="Wingdings 3" panose="05040102010807070707" charset="2"/>
         <a:buChar char=""/>
         <a:defRPr sz="1200" kern="1200">
           <a:solidFill>
@@ -7458,7 +7490,7 @@
         <a:buClr>
           <a:schemeClr val="accent1"/>
         </a:buClr>
-        <a:buFont typeface="Wingdings 3" charset="2"/>
+        <a:buFont typeface="Wingdings 3" panose="05040102010807070707" charset="2"/>
         <a:buChar char=""/>
         <a:defRPr sz="1200" kern="1200">
           <a:solidFill>
@@ -7482,7 +7514,7 @@
         <a:buClr>
           <a:schemeClr val="accent1"/>
         </a:buClr>
-        <a:buFont typeface="Wingdings 3" charset="2"/>
+        <a:buFont typeface="Wingdings 3" panose="05040102010807070707" charset="2"/>
         <a:buChar char=""/>
         <a:defRPr sz="1200" kern="1200">
           <a:solidFill>
@@ -7506,7 +7538,7 @@
         <a:buClr>
           <a:schemeClr val="accent1"/>
         </a:buClr>
-        <a:buFont typeface="Wingdings 3" charset="2"/>
+        <a:buFont typeface="Wingdings 3" panose="05040102010807070707" charset="2"/>
         <a:buChar char=""/>
         <a:defRPr sz="1200" kern="1200">
           <a:solidFill>
@@ -7660,59 +7692,27 @@
           <a:lstStyle/>
           <a:p>
             <a:pPr algn="ctr"/>
-            <a:r>
-              <a:rPr lang="en-GB" sz="2400" b="1" dirty="0" smtClean="0"/>
-              <a:t/>
-            </a:r>
             <a:br>
               <a:rPr lang="en-GB" sz="2400" b="1" dirty="0" smtClean="0"/>
             </a:br>
-            <a:r>
-              <a:rPr lang="en-GB" sz="2400" b="1" dirty="0" smtClean="0"/>
-              <a:t/>
-            </a:r>
             <a:br>
               <a:rPr lang="en-GB" sz="2400" b="1" dirty="0" smtClean="0"/>
             </a:br>
-            <a:r>
-              <a:rPr lang="en-GB" sz="2400" b="1" dirty="0" smtClean="0"/>
-              <a:t/>
-            </a:r>
             <a:br>
               <a:rPr lang="en-GB" sz="2400" b="1" dirty="0" smtClean="0"/>
             </a:br>
-            <a:r>
-              <a:rPr lang="en-GB" sz="2400" b="1" dirty="0"/>
-              <a:t/>
-            </a:r>
             <a:br>
               <a:rPr lang="en-GB" sz="2400" b="1" dirty="0"/>
             </a:br>
-            <a:r>
-              <a:rPr lang="en-GB" sz="2400" b="1" dirty="0" smtClean="0"/>
-              <a:t/>
-            </a:r>
             <a:br>
               <a:rPr lang="en-GB" sz="2400" b="1" dirty="0" smtClean="0"/>
             </a:br>
-            <a:r>
-              <a:rPr lang="en-GB" sz="2400" b="1" dirty="0"/>
-              <a:t/>
-            </a:r>
             <a:br>
               <a:rPr lang="en-GB" sz="2400" b="1" dirty="0"/>
             </a:br>
-            <a:r>
-              <a:rPr lang="en-GB" sz="2400" b="1" dirty="0" smtClean="0"/>
-              <a:t/>
-            </a:r>
             <a:br>
               <a:rPr lang="en-GB" sz="2400" b="1" dirty="0" smtClean="0"/>
             </a:br>
-            <a:r>
-              <a:rPr lang="en-GB" sz="2400" b="1" dirty="0"/>
-              <a:t/>
-            </a:r>
             <a:br>
               <a:rPr lang="en-GB" sz="2400" b="1" dirty="0"/>
             </a:br>
@@ -7724,17 +7724,9 @@
               <a:rPr lang="en-GB" sz="2400" b="1" dirty="0" err="1" smtClean="0"/>
               <a:t>Oluwajembola</a:t>
             </a:r>
-            <a:r>
-              <a:rPr lang="en-US" sz="2400" b="1" dirty="0"/>
-              <a:t/>
-            </a:r>
             <a:br>
               <a:rPr lang="en-US" sz="2400" b="1" dirty="0"/>
             </a:br>
-            <a:r>
-              <a:rPr lang="en-US" sz="2400" b="1" dirty="0" smtClean="0"/>
-              <a:t/>
-            </a:r>
             <a:br>
               <a:rPr lang="en-US" sz="2400" b="1" dirty="0" smtClean="0"/>
             </a:br>
@@ -7745,9 +7737,7 @@
       <p:sp>
         <p:nvSpPr>
           <p:cNvPr id="4" name="Title 1"/>
-          <p:cNvSpPr txBox="1">
-            <a:spLocks/>
-          </p:cNvSpPr>
+          <p:cNvSpPr txBox="1"/>
           <p:nvPr/>
         </p:nvSpPr>
         <p:spPr>
@@ -7848,17 +7838,9 @@
               <a:rPr lang="en-GB" sz="3400" b="1" dirty="0"/>
               <a:t>THE PROJECT</a:t>
             </a:r>
-            <a:r>
-              <a:rPr lang="en-GB" sz="3200" b="1" dirty="0" smtClean="0"/>
-              <a:t/>
-            </a:r>
             <a:br>
               <a:rPr lang="en-GB" sz="3200" b="1" dirty="0" smtClean="0"/>
             </a:br>
-            <a:r>
-              <a:rPr lang="en-GB" sz="3200" b="1" dirty="0" smtClean="0"/>
-              <a:t/>
-            </a:r>
             <a:br>
               <a:rPr lang="en-GB" sz="3200" b="1" dirty="0" smtClean="0"/>
             </a:br>
@@ -7871,11 +7853,6 @@
         </p:txBody>
       </p:sp>
     </p:spTree>
-    <p:extLst>
-      <p:ext uri="{BB962C8B-B14F-4D97-AF65-F5344CB8AC3E}">
-        <p14:creationId xmlns:p14="http://schemas.microsoft.com/office/powerpoint/2010/main" val="3715885106"/>
-      </p:ext>
-    </p:extLst>
   </p:cSld>
   <p:clrMapOvr>
     <a:masterClrMapping/>
@@ -7934,15 +7911,11 @@
               <a:rPr lang="en-US" sz="4400" b="1" dirty="0"/>
               <a:t>QUIZ</a:t>
             </a:r>
+            <a:endParaRPr lang="en-US" sz="4400" b="1" dirty="0"/>
           </a:p>
         </p:txBody>
       </p:sp>
     </p:spTree>
-    <p:extLst>
-      <p:ext uri="{BB962C8B-B14F-4D97-AF65-F5344CB8AC3E}">
-        <p14:creationId xmlns:p14="http://schemas.microsoft.com/office/powerpoint/2010/main" val="79259012"/>
-      </p:ext>
-    </p:extLst>
   </p:cSld>
   <p:clrMapOvr>
     <a:masterClrMapping/>
@@ -8015,9 +7988,7 @@
       <p:sp>
         <p:nvSpPr>
           <p:cNvPr id="5" name="Title 1"/>
-          <p:cNvSpPr txBox="1">
-            <a:spLocks/>
-          </p:cNvSpPr>
+          <p:cNvSpPr txBox="1"/>
           <p:nvPr/>
         </p:nvSpPr>
         <p:spPr>
@@ -8126,7 +8097,7 @@
         <p:spPr>
           <a:xfrm>
             <a:off x="1195754" y="1419285"/>
-            <a:ext cx="10996246" cy="5016758"/>
+            <a:ext cx="10996246" cy="5015865"/>
           </a:xfrm>
           <a:prstGeom prst="rect">
             <a:avLst/>
@@ -8160,7 +8131,7 @@
             </a:r>
             <a:r>
               <a:rPr lang="en-US" sz="2000" dirty="0" smtClean="0"/>
-              <a:t>manager.</a:t>
+              <a:t>manager. (Initiating)</a:t>
             </a:r>
             <a:endParaRPr lang="en-US" sz="2000" dirty="0"/>
           </a:p>
@@ -8179,8 +8150,15 @@
             </a:r>
             <a:r>
               <a:rPr lang="en-US" sz="2000" dirty="0"/>
-              <a:t>the project manager.</a:t>
-            </a:r>
+              <a:t>the project manager. </a:t>
+            </a:r>
+            <a:r>
+              <a:rPr lang="en-US" sz="2000" dirty="0" smtClean="0">
+                <a:sym typeface="+mn-ea"/>
+              </a:rPr>
+              <a:t>(Initiating)</a:t>
+            </a:r>
+            <a:endParaRPr lang="en-US" sz="2000" dirty="0"/>
           </a:p>
           <a:p>
             <a:r>
@@ -8189,8 +8167,15 @@
             </a:r>
             <a:r>
               <a:rPr lang="en-US" sz="2000" dirty="0"/>
-              <a:t>Collect historical information.</a:t>
-            </a:r>
+              <a:t>Collect historical information. </a:t>
+            </a:r>
+            <a:r>
+              <a:rPr lang="en-US" sz="2000" dirty="0" smtClean="0">
+                <a:sym typeface="+mn-ea"/>
+              </a:rPr>
+              <a:t>(Initiating)</a:t>
+            </a:r>
+            <a:endParaRPr lang="en-US" sz="2000" dirty="0"/>
           </a:p>
           <a:p>
             <a:r>
@@ -8209,6 +8194,7 @@
               <a:rPr lang="en-US" sz="2000" dirty="0"/>
               <a:t>rules and apply</a:t>
             </a:r>
+            <a:endParaRPr lang="en-US" sz="2000" dirty="0"/>
           </a:p>
           <a:p>
             <a:r>
@@ -8225,7 +8211,13 @@
             </a:r>
             <a:r>
               <a:rPr lang="en-US" sz="2000" dirty="0" smtClean="0"/>
-              <a:t>.</a:t>
+              <a:t>. </a:t>
+            </a:r>
+            <a:r>
+              <a:rPr lang="en-US" sz="2000" dirty="0" smtClean="0">
+                <a:sym typeface="+mn-ea"/>
+              </a:rPr>
+              <a:t>(Initiating)</a:t>
             </a:r>
             <a:endParaRPr lang="en-US" sz="2000" dirty="0"/>
           </a:p>
@@ -8246,6 +8238,7 @@
               <a:rPr lang="en-US" sz="2000" dirty="0"/>
               <a:t>their influence, expectations, and</a:t>
             </a:r>
+            <a:endParaRPr lang="en-US" sz="2000" dirty="0"/>
           </a:p>
           <a:p>
             <a:r>
@@ -8258,8 +8251,15 @@
             </a:r>
             <a:r>
               <a:rPr lang="en-US" sz="2000" dirty="0"/>
-              <a:t>.</a:t>
-            </a:r>
+              <a:t>. </a:t>
+            </a:r>
+            <a:r>
+              <a:rPr lang="en-US" sz="2000" dirty="0" smtClean="0">
+                <a:sym typeface="+mn-ea"/>
+              </a:rPr>
+              <a:t>(Initiating)</a:t>
+            </a:r>
+            <a:endParaRPr lang="en-US" sz="2000" dirty="0"/>
           </a:p>
           <a:p>
             <a:r>
@@ -8278,6 +8278,13 @@
               <a:rPr lang="en-US" sz="2000" dirty="0"/>
               <a:t>requirements, constraints, assumptions, and risks.</a:t>
             </a:r>
+            <a:r>
+              <a:rPr lang="en-US" sz="2000" dirty="0" smtClean="0">
+                <a:sym typeface="+mn-ea"/>
+              </a:rPr>
+              <a:t>(Initiating)</a:t>
+            </a:r>
+            <a:endParaRPr lang="en-US" sz="2000" dirty="0"/>
           </a:p>
           <a:p>
             <a:r>
@@ -8288,11 +8295,18 @@
               <a:rPr lang="en-US" sz="2000" dirty="0"/>
               <a:t>Turn high-level stakeholder needs, wants, and expectations into</a:t>
             </a:r>
+            <a:endParaRPr lang="en-US" sz="2000" dirty="0"/>
           </a:p>
           <a:p>
             <a:r>
               <a:rPr lang="en-US" sz="2000" dirty="0" smtClean="0"/>
-              <a:t>requirement.</a:t>
+              <a:t>requirement. </a:t>
+            </a:r>
+            <a:r>
+              <a:rPr lang="en-US" sz="2000" dirty="0" smtClean="0">
+                <a:sym typeface="+mn-ea"/>
+              </a:rPr>
+              <a:t>(Initiating)</a:t>
             </a:r>
             <a:endParaRPr lang="en-US" sz="2000" dirty="0"/>
           </a:p>
@@ -8321,6 +8335,7 @@
               <a:rPr lang="en-US" sz="2000" dirty="0"/>
               <a:t>the</a:t>
             </a:r>
+            <a:endParaRPr lang="en-US" sz="2000" dirty="0"/>
           </a:p>
           <a:p>
             <a:r>
@@ -8343,6 +8358,13 @@
               <a:rPr lang="en-US" sz="2000" dirty="0"/>
               <a:t>.</a:t>
             </a:r>
+            <a:r>
+              <a:rPr lang="en-US" sz="2000" dirty="0" smtClean="0">
+                <a:sym typeface="+mn-ea"/>
+              </a:rPr>
+              <a:t>(Initiating)</a:t>
+            </a:r>
+            <a:endParaRPr lang="en-US" sz="2000" dirty="0"/>
           </a:p>
           <a:p>
             <a:r>
@@ -8377,6 +8399,13 @@
               <a:rPr lang="en-US" sz="2000" dirty="0"/>
               <a:t>to deliver to the business.</a:t>
             </a:r>
+            <a:r>
+              <a:rPr lang="en-US" sz="2000" dirty="0" smtClean="0">
+                <a:sym typeface="+mn-ea"/>
+              </a:rPr>
+              <a:t>(Initiating)</a:t>
+            </a:r>
+            <a:endParaRPr lang="en-US" sz="2000" dirty="0"/>
           </a:p>
           <a:p>
             <a:r>
@@ -8407,16 +8436,17 @@
               <a:rPr lang="en-US" sz="2000" dirty="0" smtClean="0"/>
               <a:t>as is practical</a:t>
             </a:r>
+            <a:r>
+              <a:rPr lang="en-US" sz="2000" dirty="0" smtClean="0">
+                <a:sym typeface="+mn-ea"/>
+              </a:rPr>
+              <a:t>(Initiating)</a:t>
+            </a:r>
             <a:endParaRPr lang="en-US" sz="2000" dirty="0"/>
           </a:p>
         </p:txBody>
       </p:sp>
     </p:spTree>
-    <p:extLst>
-      <p:ext uri="{BB962C8B-B14F-4D97-AF65-F5344CB8AC3E}">
-        <p14:creationId xmlns:p14="http://schemas.microsoft.com/office/powerpoint/2010/main" val="2662829638"/>
-      </p:ext>
-    </p:extLst>
   </p:cSld>
   <p:clrMapOvr>
     <a:masterClrMapping/>
@@ -8451,9 +8481,7 @@
       <p:sp>
         <p:nvSpPr>
           <p:cNvPr id="5" name="Title 1"/>
-          <p:cNvSpPr txBox="1">
-            <a:spLocks/>
-          </p:cNvSpPr>
+          <p:cNvSpPr txBox="1"/>
           <p:nvPr/>
         </p:nvSpPr>
         <p:spPr>
@@ -8561,8 +8589,8 @@
         </p:nvSpPr>
         <p:spPr>
           <a:xfrm>
-            <a:off x="1195754" y="1330404"/>
-            <a:ext cx="10914184" cy="5324535"/>
+            <a:off x="789940" y="1113790"/>
+            <a:ext cx="11739880" cy="5908040"/>
           </a:xfrm>
           <a:prstGeom prst="rect">
             <a:avLst/>
@@ -8575,280 +8603,353 @@
           <a:lstStyle/>
           <a:p>
             <a:r>
-              <a:rPr lang="en-US" sz="2000" dirty="0" smtClean="0"/>
+              <a:rPr lang="en-US" sz="2100" dirty="0" smtClean="0"/>
               <a:t>11. Understand </a:t>
             </a:r>
             <a:r>
-              <a:rPr lang="en-US" sz="2000" dirty="0"/>
+              <a:rPr lang="en-US" sz="2100" dirty="0"/>
               <a:t>how the project supports the organizations </a:t>
             </a:r>
             <a:r>
-              <a:rPr lang="en-US" sz="2000" dirty="0" smtClean="0"/>
-              <a:t>strategic  objectives</a:t>
-            </a:r>
-            <a:endParaRPr lang="en-US" sz="2000" dirty="0"/>
-          </a:p>
-          <a:p>
-            <a:r>
-              <a:rPr lang="en-US" sz="2000" dirty="0" smtClean="0"/>
+              <a:rPr lang="en-US" sz="2100" dirty="0" smtClean="0"/>
+              <a:t>strategic objectives </a:t>
+            </a:r>
+            <a:r>
+              <a:rPr lang="en-US" sz="2100" dirty="0" smtClean="0">
+                <a:sym typeface="+mn-ea"/>
+              </a:rPr>
+              <a:t>(Initiating)</a:t>
+            </a:r>
+            <a:endParaRPr lang="en-US" sz="2100" dirty="0"/>
+          </a:p>
+          <a:p>
+            <a:r>
+              <a:rPr lang="en-US" sz="2100" dirty="0" smtClean="0"/>
               <a:t>12. </a:t>
             </a:r>
             <a:r>
-              <a:rPr lang="en-US" sz="2000" dirty="0"/>
+              <a:rPr lang="en-US" sz="2100" dirty="0"/>
               <a:t>Collect and use any </a:t>
             </a:r>
             <a:r>
-              <a:rPr lang="en-US" sz="2000" dirty="0" smtClean="0"/>
+              <a:rPr lang="en-US" sz="2100" dirty="0" smtClean="0"/>
               <a:t>relevant</a:t>
             </a:r>
             <a:r>
-              <a:rPr lang="en-US" sz="2000" dirty="0"/>
+              <a:rPr lang="en-US" sz="2100" dirty="0"/>
               <a:t>, existing agreements {including contracts)</a:t>
             </a:r>
-          </a:p>
-          <a:p>
-            <a:r>
-              <a:rPr lang="en-US" sz="2000" dirty="0"/>
+            <a:endParaRPr lang="en-US" sz="2100" dirty="0"/>
+          </a:p>
+          <a:p>
+            <a:r>
+              <a:rPr lang="en-US" sz="2100" dirty="0"/>
               <a:t>that might be generating the </a:t>
             </a:r>
             <a:r>
-              <a:rPr lang="en-US" sz="2000" dirty="0" smtClean="0"/>
+              <a:rPr lang="en-US" sz="2100" dirty="0" smtClean="0"/>
               <a:t>project </a:t>
             </a:r>
             <a:r>
-              <a:rPr lang="en-US" sz="2000" dirty="0"/>
+              <a:rPr lang="en-US" sz="2100" dirty="0"/>
               <a:t>or that will be required during </a:t>
             </a:r>
             <a:r>
-              <a:rPr lang="en-US" sz="2000" dirty="0" smtClean="0"/>
+              <a:rPr lang="en-US" sz="2100" dirty="0" smtClean="0"/>
               <a:t>the project</a:t>
             </a:r>
             <a:r>
-              <a:rPr lang="en-US" sz="2000" dirty="0"/>
-              <a:t>.</a:t>
-            </a:r>
-          </a:p>
-          <a:p>
-            <a:r>
-              <a:rPr lang="en-US" sz="2000" dirty="0" smtClean="0"/>
+              <a:rPr lang="en-US" sz="2100" dirty="0"/>
+              <a:t>. </a:t>
+            </a:r>
+            <a:r>
+              <a:rPr lang="en-US" sz="2100" dirty="0" smtClean="0">
+                <a:sym typeface="+mn-ea"/>
+              </a:rPr>
+              <a:t>(Initiating)</a:t>
+            </a:r>
+            <a:endParaRPr lang="en-US" sz="2100" dirty="0"/>
+          </a:p>
+          <a:p>
+            <a:r>
+              <a:rPr lang="en-US" sz="2100" dirty="0" smtClean="0"/>
               <a:t>13. </a:t>
             </a:r>
             <a:r>
-              <a:rPr lang="en-US" sz="2000" dirty="0"/>
+              <a:rPr lang="en-US" sz="2100" dirty="0"/>
               <a:t>Determine success </a:t>
             </a:r>
             <a:r>
-              <a:rPr lang="en-US" sz="2000" dirty="0" smtClean="0"/>
+              <a:rPr lang="en-US" sz="2100" dirty="0" smtClean="0"/>
               <a:t>criteria </a:t>
             </a:r>
             <a:r>
-              <a:rPr lang="en-US" sz="2000" dirty="0"/>
+              <a:rPr lang="en-US" sz="2100" dirty="0"/>
               <a:t>and measurable project and product</a:t>
             </a:r>
-          </a:p>
-          <a:p>
-            <a:r>
-              <a:rPr lang="en-US" sz="2000" dirty="0"/>
-              <a:t>objectives.</a:t>
-            </a:r>
-          </a:p>
-          <a:p>
-            <a:r>
-              <a:rPr lang="en-US" sz="2000" dirty="0" smtClean="0"/>
+            <a:endParaRPr lang="en-US" sz="2100" dirty="0"/>
+          </a:p>
+          <a:p>
+            <a:r>
+              <a:rPr lang="en-US" sz="2100" dirty="0"/>
+              <a:t>objectives. </a:t>
+            </a:r>
+            <a:r>
+              <a:rPr lang="en-US" sz="2100" dirty="0" smtClean="0">
+                <a:sym typeface="+mn-ea"/>
+              </a:rPr>
+              <a:t>(Initiating)</a:t>
+            </a:r>
+            <a:endParaRPr lang="en-US" sz="2100" dirty="0"/>
+          </a:p>
+          <a:p>
+            <a:r>
+              <a:rPr lang="en-US" sz="2100" dirty="0" smtClean="0"/>
               <a:t>14. </a:t>
             </a:r>
             <a:r>
-              <a:rPr lang="en-US" sz="2000" dirty="0"/>
+              <a:rPr lang="en-US" sz="2100" dirty="0"/>
               <a:t>Facilitate the resolution of </a:t>
             </a:r>
             <a:r>
-              <a:rPr lang="en-US" sz="2000" dirty="0" smtClean="0"/>
+              <a:rPr lang="en-US" sz="2100" dirty="0" smtClean="0"/>
               <a:t>conflicting </a:t>
             </a:r>
             <a:r>
-              <a:rPr lang="en-US" sz="2000" dirty="0"/>
+              <a:rPr lang="en-US" sz="2100" dirty="0"/>
               <a:t>objectives</a:t>
             </a:r>
             <a:r>
-              <a:rPr lang="en-US" sz="2000" dirty="0" smtClean="0"/>
-              <a:t>.</a:t>
-            </a:r>
-          </a:p>
-          <a:p>
-            <a:r>
-              <a:rPr lang="en-US" sz="2000" dirty="0" smtClean="0"/>
+              <a:rPr lang="en-US" sz="2100" dirty="0" smtClean="0"/>
+              <a:t>. </a:t>
+            </a:r>
+            <a:r>
+              <a:rPr lang="en-US" sz="2100" dirty="0" smtClean="0">
+                <a:sym typeface="+mn-ea"/>
+              </a:rPr>
+              <a:t>(Initiating)</a:t>
+            </a:r>
+            <a:endParaRPr lang="en-US" sz="2100" dirty="0" smtClean="0"/>
+          </a:p>
+          <a:p>
+            <a:r>
+              <a:rPr lang="en-US" sz="2100" dirty="0" smtClean="0"/>
               <a:t>15. Become </a:t>
             </a:r>
             <a:r>
-              <a:rPr lang="en-US" sz="2000" dirty="0"/>
+              <a:rPr lang="en-US" sz="2100" dirty="0"/>
               <a:t>familiar with the company culture and structure as they relate </a:t>
             </a:r>
             <a:r>
-              <a:rPr lang="en-US" sz="2000" dirty="0" smtClean="0"/>
+              <a:rPr lang="en-US" sz="2100" dirty="0" smtClean="0"/>
               <a:t>to the </a:t>
             </a:r>
             <a:r>
-              <a:rPr lang="en-US" sz="2000" dirty="0"/>
-              <a:t>project.</a:t>
-            </a:r>
-          </a:p>
-          <a:p>
-            <a:r>
-              <a:rPr lang="en-US" sz="2000" dirty="0" smtClean="0"/>
+              <a:rPr lang="en-US" sz="2100" dirty="0"/>
+              <a:t>project. </a:t>
+            </a:r>
+            <a:r>
+              <a:rPr lang="en-US" sz="2100" dirty="0" smtClean="0">
+                <a:sym typeface="+mn-ea"/>
+              </a:rPr>
+              <a:t>(Initiating)</a:t>
+            </a:r>
+            <a:endParaRPr lang="en-US" sz="2100" dirty="0"/>
+          </a:p>
+          <a:p>
+            <a:r>
+              <a:rPr lang="en-US" sz="2100" dirty="0" smtClean="0"/>
               <a:t>16.  </a:t>
             </a:r>
             <a:r>
-              <a:rPr lang="en-US" sz="2000" dirty="0"/>
+              <a:rPr lang="en-US" sz="2100" dirty="0"/>
               <a:t>Find existing processes, standards, and compliance requirements </a:t>
             </a:r>
             <a:r>
-              <a:rPr lang="en-US" sz="2000" dirty="0" smtClean="0"/>
+              <a:rPr lang="en-US" sz="2100" dirty="0" smtClean="0"/>
               <a:t>that affect </a:t>
             </a:r>
             <a:r>
-              <a:rPr lang="en-US" sz="2000" dirty="0"/>
-              <a:t>the project.</a:t>
-            </a:r>
-          </a:p>
-          <a:p>
-            <a:r>
-              <a:rPr lang="en-US" sz="2000" dirty="0" smtClean="0"/>
+              <a:rPr lang="en-US" sz="2100" dirty="0"/>
+              <a:t>the project. </a:t>
+            </a:r>
+            <a:r>
+              <a:rPr lang="en-US" sz="2100" dirty="0" smtClean="0">
+                <a:sym typeface="+mn-ea"/>
+              </a:rPr>
+              <a:t>(Initiating)</a:t>
+            </a:r>
+            <a:endParaRPr lang="en-US" sz="2100" dirty="0"/>
+          </a:p>
+          <a:p>
+            <a:r>
+              <a:rPr lang="en-US" sz="2100" dirty="0" smtClean="0"/>
               <a:t>17. </a:t>
             </a:r>
             <a:r>
-              <a:rPr lang="en-US" sz="2000" dirty="0"/>
+              <a:rPr lang="en-US" sz="2100" dirty="0"/>
               <a:t>Understand how the organization does </a:t>
             </a:r>
             <a:r>
-              <a:rPr lang="en-US" sz="2000" dirty="0" smtClean="0"/>
+              <a:rPr lang="en-US" sz="2100" dirty="0" smtClean="0"/>
               <a:t>business </a:t>
             </a:r>
             <a:r>
-              <a:rPr lang="en-US" sz="2000" dirty="0"/>
+              <a:rPr lang="en-US" sz="2100" dirty="0"/>
               <a:t>(business </a:t>
             </a:r>
             <a:r>
-              <a:rPr lang="en-US" sz="2000" dirty="0" smtClean="0"/>
+              <a:rPr lang="en-US" sz="2100" dirty="0" smtClean="0"/>
               <a:t>knowledge) and </a:t>
             </a:r>
             <a:r>
-              <a:rPr lang="en-US" sz="2000" dirty="0"/>
+              <a:rPr lang="en-US" sz="2100" dirty="0"/>
               <a:t>what </a:t>
             </a:r>
             <a:r>
-              <a:rPr lang="en-US" sz="2000" dirty="0" smtClean="0"/>
+              <a:rPr lang="en-US" sz="2100" dirty="0" smtClean="0"/>
               <a:t> </a:t>
             </a:r>
             <a:r>
-              <a:rPr lang="en-US" sz="2000" dirty="0"/>
+              <a:rPr lang="en-US" sz="2100" dirty="0"/>
               <a:t>procedures, and policies are already in place to </a:t>
             </a:r>
             <a:r>
-              <a:rPr lang="en-US" sz="2000" dirty="0" smtClean="0"/>
+              <a:rPr lang="en-US" sz="2100" dirty="0" smtClean="0"/>
               <a:t>use on </a:t>
             </a:r>
             <a:r>
-              <a:rPr lang="en-US" sz="2000" dirty="0"/>
-              <a:t>the project.</a:t>
-            </a:r>
-          </a:p>
-          <a:p>
-            <a:r>
-              <a:rPr lang="en-US" sz="2000" dirty="0" smtClean="0"/>
+              <a:rPr lang="en-US" sz="2100" dirty="0"/>
+              <a:t>the project. </a:t>
+            </a:r>
+            <a:r>
+              <a:rPr lang="en-US" sz="2100" dirty="0" smtClean="0">
+                <a:sym typeface="+mn-ea"/>
+              </a:rPr>
+              <a:t>(Initiating)</a:t>
+            </a:r>
+            <a:endParaRPr lang="en-US" sz="2100" dirty="0"/>
+          </a:p>
+          <a:p>
+            <a:r>
+              <a:rPr lang="en-US" sz="2100" dirty="0" smtClean="0"/>
               <a:t>18. </a:t>
             </a:r>
             <a:r>
-              <a:rPr lang="en-US" sz="2000" dirty="0"/>
+              <a:rPr lang="en-US" sz="2100" dirty="0"/>
               <a:t>Do </a:t>
             </a:r>
             <a:r>
-              <a:rPr lang="en-US" sz="2000" dirty="0" smtClean="0"/>
+              <a:rPr lang="en-US" sz="2100" dirty="0" smtClean="0"/>
               <a:t>planning </a:t>
             </a:r>
             <a:r>
-              <a:rPr lang="en-US" sz="2000" dirty="0"/>
-              <a:t>on a high-level basis.</a:t>
-            </a:r>
-          </a:p>
-          <a:p>
-            <a:r>
-              <a:rPr lang="en-US" sz="2000" dirty="0" smtClean="0"/>
+              <a:rPr lang="en-US" sz="2100" dirty="0"/>
+              <a:t>on a high-level basis. </a:t>
+            </a:r>
+            <a:r>
+              <a:rPr lang="en-US" sz="2100" dirty="0" smtClean="0">
+                <a:sym typeface="+mn-ea"/>
+              </a:rPr>
+              <a:t>(Initiating)</a:t>
+            </a:r>
+            <a:endParaRPr lang="en-US" sz="2100" dirty="0"/>
+          </a:p>
+          <a:p>
+            <a:r>
+              <a:rPr lang="en-US" sz="2100" dirty="0" smtClean="0"/>
               <a:t>19. </a:t>
             </a:r>
             <a:r>
-              <a:rPr lang="en-US" sz="2000" dirty="0"/>
+              <a:rPr lang="en-US" sz="2100" dirty="0"/>
               <a:t>Perform high - </a:t>
             </a:r>
             <a:r>
-              <a:rPr lang="en-US" sz="2000" dirty="0" smtClean="0"/>
+              <a:rPr lang="en-US" sz="2100" dirty="0" smtClean="0"/>
               <a:t>level estimating </a:t>
             </a:r>
             <a:r>
-              <a:rPr lang="en-US" sz="2000" dirty="0"/>
+              <a:rPr lang="en-US" sz="2100" dirty="0"/>
               <a:t>for the </a:t>
             </a:r>
             <a:r>
-              <a:rPr lang="en-US" sz="2000" dirty="0" smtClean="0"/>
+              <a:rPr lang="en-US" sz="2100" dirty="0" smtClean="0"/>
               <a:t>project schedule </a:t>
             </a:r>
             <a:r>
-              <a:rPr lang="en-US" sz="2000" dirty="0"/>
-              <a:t>and budget.</a:t>
-            </a:r>
-          </a:p>
-          <a:p>
-            <a:r>
-              <a:rPr lang="en-US" sz="2000" dirty="0" smtClean="0"/>
+              <a:rPr lang="en-US" sz="2100" dirty="0"/>
+              <a:t>and budget. </a:t>
+            </a:r>
+            <a:r>
+              <a:rPr lang="en-US" sz="2100" dirty="0" smtClean="0">
+                <a:sym typeface="+mn-ea"/>
+              </a:rPr>
+              <a:t>(Initiating)</a:t>
+            </a:r>
+            <a:endParaRPr lang="en-US" sz="2100" dirty="0"/>
+          </a:p>
+          <a:p>
+            <a:r>
+              <a:rPr lang="en-US" sz="2100" dirty="0" smtClean="0"/>
               <a:t>20. </a:t>
             </a:r>
             <a:r>
-              <a:rPr lang="en-US" sz="2000" dirty="0"/>
+              <a:rPr lang="en-US" sz="2100" dirty="0"/>
               <a:t>Use the high-level planning and </a:t>
             </a:r>
             <a:r>
-              <a:rPr lang="en-US" sz="2000" dirty="0" smtClean="0"/>
+              <a:rPr lang="en-US" sz="2100" dirty="0" smtClean="0"/>
               <a:t>estimating </a:t>
             </a:r>
             <a:r>
-              <a:rPr lang="en-US" sz="2000" dirty="0"/>
+              <a:rPr lang="en-US" sz="2100" dirty="0"/>
               <a:t>data to determine whether the</a:t>
             </a:r>
-          </a:p>
-          <a:p>
-            <a:r>
-              <a:rPr lang="en-US" sz="2000" dirty="0"/>
+            <a:endParaRPr lang="en-US" sz="2100" dirty="0"/>
+          </a:p>
+          <a:p>
+            <a:r>
+              <a:rPr lang="en-US" sz="2100" dirty="0"/>
               <a:t>project </a:t>
             </a:r>
             <a:r>
-              <a:rPr lang="en-US" sz="2000" dirty="0" smtClean="0"/>
+              <a:rPr lang="en-US" sz="2100" dirty="0" smtClean="0"/>
               <a:t>objectives </a:t>
             </a:r>
             <a:r>
-              <a:rPr lang="en-US" sz="2000" dirty="0"/>
+              <a:rPr lang="en-US" sz="2100" dirty="0"/>
               <a:t>can be achieved within the given constraints and</a:t>
             </a:r>
-          </a:p>
-          <a:p>
-            <a:r>
-              <a:rPr lang="en-US" sz="2000" dirty="0"/>
+            <a:endParaRPr lang="en-US" sz="2100" dirty="0"/>
+          </a:p>
+          <a:p>
+            <a:r>
+              <a:rPr lang="en-US" sz="2100" dirty="0"/>
               <a:t>whether the expected </a:t>
             </a:r>
             <a:r>
-              <a:rPr lang="en-US" sz="2000" dirty="0" smtClean="0"/>
+              <a:rPr lang="en-US" sz="2100" dirty="0" smtClean="0"/>
               <a:t>benefits </a:t>
             </a:r>
             <a:r>
-              <a:rPr lang="en-US" sz="2000" dirty="0"/>
+              <a:rPr lang="en-US" sz="2100" dirty="0"/>
               <a:t>can </a:t>
             </a:r>
             <a:r>
-              <a:rPr lang="en-US" sz="2000" dirty="0" smtClean="0"/>
+              <a:rPr lang="en-US" sz="2100" dirty="0" smtClean="0"/>
               <a:t>be </a:t>
             </a:r>
             <a:r>
-              <a:rPr lang="en-US" sz="2000" dirty="0"/>
-              <a:t>realized</a:t>
-            </a:r>
+              <a:rPr lang="en-US" sz="2100" dirty="0"/>
+              <a:t>realized </a:t>
+            </a:r>
+            <a:r>
+              <a:rPr lang="en-US" sz="2100" dirty="0" smtClean="0">
+                <a:sym typeface="+mn-ea"/>
+              </a:rPr>
+              <a:t>(Initiating)</a:t>
+            </a:r>
+            <a:endParaRPr lang="en-US" sz="2100" dirty="0"/>
           </a:p>
         </p:txBody>
       </p:sp>
@@ -8898,11 +8999,6 @@
         </p:txBody>
       </p:sp>
     </p:spTree>
-    <p:extLst>
-      <p:ext uri="{BB962C8B-B14F-4D97-AF65-F5344CB8AC3E}">
-        <p14:creationId xmlns:p14="http://schemas.microsoft.com/office/powerpoint/2010/main" val="3405868820"/>
-      </p:ext>
-    </p:extLst>
   </p:cSld>
   <p:clrMapOvr>
     <a:masterClrMapping/>
@@ -8937,9 +9033,7 @@
       <p:sp>
         <p:nvSpPr>
           <p:cNvPr id="5" name="Title 1"/>
-          <p:cNvSpPr txBox="1">
-            <a:spLocks/>
-          </p:cNvSpPr>
+          <p:cNvSpPr txBox="1"/>
           <p:nvPr/>
         </p:nvSpPr>
         <p:spPr>
@@ -9047,8 +9141,8 @@
         </p:nvSpPr>
         <p:spPr>
           <a:xfrm>
-            <a:off x="1195754" y="1340366"/>
-            <a:ext cx="10850684" cy="5324535"/>
+            <a:off x="681990" y="1340485"/>
+            <a:ext cx="11364595" cy="5631180"/>
           </a:xfrm>
           <a:prstGeom prst="rect">
             <a:avLst/>
@@ -9074,7 +9168,13 @@
             </a:r>
             <a:r>
               <a:rPr lang="en-US" sz="2000" dirty="0" err="1" smtClean="0"/>
-              <a:t>detaiL</a:t>
+              <a:t>detaiL </a:t>
+            </a:r>
+            <a:r>
+              <a:rPr lang="en-US" sz="2000" dirty="0" smtClean="0">
+                <a:sym typeface="+mn-ea"/>
+              </a:rPr>
+              <a:t>(Initiating)</a:t>
             </a:r>
             <a:endParaRPr lang="en-US" sz="2000" dirty="0"/>
           </a:p>
@@ -9093,8 +9193,15 @@
             </a:r>
             <a:r>
               <a:rPr lang="en-US" sz="2000" dirty="0"/>
-              <a:t>.</a:t>
-            </a:r>
+              <a:t>. </a:t>
+            </a:r>
+            <a:r>
+              <a:rPr lang="en-US" sz="2000" dirty="0" smtClean="0">
+                <a:sym typeface="+mn-ea"/>
+              </a:rPr>
+              <a:t>(Initiating)</a:t>
+            </a:r>
+            <a:endParaRPr lang="en-US" sz="2000" dirty="0"/>
           </a:p>
           <a:p>
             <a:r>
@@ -9129,6 +9236,13 @@
               <a:rPr lang="en-US" sz="2000" dirty="0"/>
               <a:t>project.</a:t>
             </a:r>
+            <a:r>
+              <a:rPr lang="en-US" sz="2000" dirty="0" smtClean="0">
+                <a:sym typeface="+mn-ea"/>
+              </a:rPr>
+              <a:t>(Initiating)</a:t>
+            </a:r>
+            <a:endParaRPr lang="en-US" sz="2000" dirty="0"/>
           </a:p>
           <a:p>
             <a:r>
@@ -9139,6 +9253,13 @@
               <a:rPr lang="en-US" sz="2000" dirty="0"/>
               <a:t>Determine the initial project organization.</a:t>
             </a:r>
+            <a:r>
+              <a:rPr lang="en-US" sz="2000" dirty="0" smtClean="0">
+                <a:sym typeface="+mn-ea"/>
+              </a:rPr>
+              <a:t>(Initiating)</a:t>
+            </a:r>
+            <a:endParaRPr lang="en-US" sz="2000" dirty="0"/>
           </a:p>
           <a:p>
             <a:r>
@@ -9157,6 +9278,13 @@
               <a:rPr lang="en-US" sz="2000" dirty="0"/>
               <a:t>on the project.</a:t>
             </a:r>
+            <a:r>
+              <a:rPr lang="en-US" sz="2000" dirty="0" smtClean="0">
+                <a:sym typeface="+mn-ea"/>
+              </a:rPr>
+              <a:t>(Initiating)</a:t>
+            </a:r>
+            <a:endParaRPr lang="en-US" sz="2000" dirty="0"/>
           </a:p>
           <a:p>
             <a:r>
@@ -9167,6 +9295,13 @@
               <a:rPr lang="en-US" sz="2000" dirty="0"/>
               <a:t>the project charter.</a:t>
             </a:r>
+            <a:r>
+              <a:rPr lang="en-US" sz="2000" dirty="0" smtClean="0">
+                <a:sym typeface="+mn-ea"/>
+              </a:rPr>
+              <a:t>(Initiating)</a:t>
+            </a:r>
+            <a:endParaRPr lang="en-US" sz="2000" dirty="0"/>
           </a:p>
           <a:p>
             <a:r>
@@ -9185,6 +9320,13 @@
               <a:rPr lang="en-US" sz="2000" dirty="0"/>
               <a:t>.</a:t>
             </a:r>
+            <a:r>
+              <a:rPr lang="en-US" sz="2000" dirty="0" smtClean="0">
+                <a:sym typeface="+mn-ea"/>
+              </a:rPr>
+              <a:t>(Initiating)</a:t>
+            </a:r>
+            <a:endParaRPr lang="en-US" sz="2000" dirty="0"/>
           </a:p>
           <a:p>
             <a:r>
@@ -9203,6 +9345,13 @@
               <a:rPr lang="en-US" sz="2000" dirty="0"/>
               <a:t>be dosed).</a:t>
             </a:r>
+            <a:r>
+              <a:rPr lang="en-US" sz="2000" dirty="0" smtClean="0">
+                <a:sym typeface="+mn-ea"/>
+              </a:rPr>
+              <a:t>(Initiating)</a:t>
+            </a:r>
+            <a:endParaRPr lang="en-US" sz="2000" dirty="0"/>
           </a:p>
           <a:p>
             <a:r>
@@ -9229,6 +9378,7 @@
               <a:rPr lang="en-US" sz="2000" dirty="0"/>
               <a:t> the project charter and</a:t>
             </a:r>
+            <a:endParaRPr lang="en-US" sz="2000" dirty="0"/>
           </a:p>
           <a:p>
             <a:r>
@@ -9243,6 +9393,13 @@
               <a:rPr lang="en-US" sz="2000" dirty="0"/>
               <a:t>.</a:t>
             </a:r>
+            <a:r>
+              <a:rPr lang="en-US" sz="2000" dirty="0" smtClean="0">
+                <a:sym typeface="+mn-ea"/>
+              </a:rPr>
+              <a:t>(Initiating)</a:t>
+            </a:r>
+            <a:endParaRPr lang="en-US" sz="2000" dirty="0"/>
           </a:p>
           <a:p>
             <a:r>
@@ -9281,12 +9438,20 @@
               <a:rPr lang="en-US" sz="2000" dirty="0"/>
               <a:t>data on identified risks and</a:t>
             </a:r>
+            <a:endParaRPr lang="en-US" sz="2000" dirty="0"/>
           </a:p>
           <a:p>
             <a:r>
               <a:rPr lang="en-US" sz="2000" dirty="0"/>
               <a:t>stakeholders.</a:t>
             </a:r>
+            <a:r>
+              <a:rPr lang="en-US" sz="2000" dirty="0" smtClean="0">
+                <a:sym typeface="+mn-ea"/>
+              </a:rPr>
+              <a:t>(Initiating)</a:t>
+            </a:r>
+            <a:endParaRPr lang="en-US" sz="2000" dirty="0"/>
           </a:p>
           <a:p>
             <a:r>
@@ -9321,6 +9486,7 @@
               <a:rPr lang="en-US" sz="2000" dirty="0"/>
               <a:t>to</a:t>
             </a:r>
+            <a:endParaRPr lang="en-US" sz="2000" dirty="0"/>
           </a:p>
           <a:p>
             <a:r>
@@ -9339,6 +9505,13 @@
               <a:rPr lang="en-US" sz="2000" dirty="0"/>
               <a:t>interest, and influence.</a:t>
             </a:r>
+            <a:r>
+              <a:rPr lang="en-US" sz="2000" dirty="0" smtClean="0">
+                <a:sym typeface="+mn-ea"/>
+              </a:rPr>
+              <a:t>(Initiating)</a:t>
+            </a:r>
+            <a:endParaRPr lang="en-US" sz="2000" dirty="0"/>
           </a:p>
         </p:txBody>
       </p:sp>
@@ -9380,11 +9553,6 @@
         </p:txBody>
       </p:sp>
     </p:spTree>
-    <p:extLst>
-      <p:ext uri="{BB962C8B-B14F-4D97-AF65-F5344CB8AC3E}">
-        <p14:creationId xmlns:p14="http://schemas.microsoft.com/office/powerpoint/2010/main" val="2382839585"/>
-      </p:ext>
-    </p:extLst>
   </p:cSld>
   <p:clrMapOvr>
     <a:masterClrMapping/>
@@ -9474,15 +9642,11 @@
               <a:rPr lang="en-US" sz="3200" dirty="0"/>
               <a:t>Starting a project according to the Project Management Institute (PMI) Guide, specifically the PMBOK® Guide (Project Management Body of Knowledge), follows the Initiating Process Group. This phase establishes the foundation for a successful project by defining high-level objectives, stakeholders, and project feasibility</a:t>
             </a:r>
+            <a:endParaRPr lang="en-US" sz="3200" dirty="0"/>
           </a:p>
         </p:txBody>
       </p:sp>
     </p:spTree>
-    <p:extLst>
-      <p:ext uri="{BB962C8B-B14F-4D97-AF65-F5344CB8AC3E}">
-        <p14:creationId xmlns:p14="http://schemas.microsoft.com/office/powerpoint/2010/main" val="3947749872"/>
-      </p:ext>
-    </p:extLst>
   </p:cSld>
   <p:clrMapOvr>
     <a:masterClrMapping/>
@@ -9568,17 +9732,25 @@
             <a:pPr algn="just"/>
             <a:r>
               <a:rPr lang="en-US" sz="3200" dirty="0"/>
-              <a:t>The Project Charter is a formal document that authorizes the project and gives the project manager the authority to apply organizational resources to project activities. It serves as a high-level document that outlines the project's objectives, Key stakeholders and their roles, scope, high-level requirements and key deliverables, Budget and schedule overview, assigned project manager and their authority level.</a:t>
-            </a:r>
+              <a:t>The </a:t>
+            </a:r>
+            <a:r>
+              <a:rPr lang="en-US" sz="3200" dirty="0">
+                <a:highlight>
+                  <a:srgbClr val="FFFF00"/>
+                </a:highlight>
+              </a:rPr>
+              <a:t>Project Charter is a formal document that authorizes the project and gives the project manager the authority to apply organizational resources to project activities.</a:t>
+            </a:r>
+            <a:r>
+              <a:rPr lang="en-US" sz="3200" dirty="0"/>
+              <a:t> It serves as a high-level document that outlines the project's objectives, Key stakeholders and their roles, scope, high-level requirements and key deliverables, Budget and schedule overview, assigned project manager and their authority level.</a:t>
+            </a:r>
+            <a:endParaRPr lang="en-US" sz="3200" dirty="0"/>
           </a:p>
         </p:txBody>
       </p:sp>
     </p:spTree>
-    <p:extLst>
-      <p:ext uri="{BB962C8B-B14F-4D97-AF65-F5344CB8AC3E}">
-        <p14:creationId xmlns:p14="http://schemas.microsoft.com/office/powerpoint/2010/main" val="698431979"/>
-      </p:ext>
-    </p:extLst>
   </p:cSld>
   <p:clrMapOvr>
     <a:masterClrMapping/>
@@ -9678,6 +9850,7 @@
               <a:rPr lang="en-US" sz="3200" dirty="0"/>
               <a:t>– It grants official approval for the project to begin.</a:t>
             </a:r>
+            <a:endParaRPr lang="en-US" sz="3200" dirty="0"/>
           </a:p>
           <a:p>
             <a:pPr algn="just"/>
@@ -9693,6 +9866,7 @@
               <a:rPr lang="en-US" sz="3200" dirty="0"/>
               <a:t>– It provides a broad understanding of what the project aims to achieve.</a:t>
             </a:r>
+            <a:endParaRPr lang="en-US" sz="3200" dirty="0"/>
           </a:p>
           <a:p>
             <a:pPr algn="just"/>
@@ -9708,6 +9882,7 @@
               <a:rPr lang="en-US" sz="3200" dirty="0"/>
               <a:t>– Lists important stakeholders and their roles in the project.</a:t>
             </a:r>
+            <a:endParaRPr lang="en-US" sz="3200" dirty="0"/>
           </a:p>
           <a:p>
             <a:pPr algn="just"/>
@@ -9723,6 +9898,7 @@
               <a:rPr lang="en-US" sz="3200" dirty="0"/>
               <a:t>– Gives the project manager authority to use organizational resources.</a:t>
             </a:r>
+            <a:endParaRPr lang="en-US" sz="3200" dirty="0"/>
           </a:p>
           <a:p>
             <a:pPr algn="just"/>
@@ -9738,6 +9914,7 @@
               <a:rPr lang="en-US" sz="3200" dirty="0"/>
               <a:t>– Acts as a guiding document throughout the project lifecycle.</a:t>
             </a:r>
+            <a:endParaRPr lang="en-US" sz="3200" dirty="0"/>
           </a:p>
           <a:p>
             <a:pPr algn="just"/>
@@ -9753,15 +9930,11 @@
               <a:rPr lang="en-US" sz="3200" dirty="0"/>
               <a:t>– Ensures the project aligns with business objectives and strategic goals.</a:t>
             </a:r>
+            <a:endParaRPr lang="en-US" sz="3200" dirty="0"/>
           </a:p>
         </p:txBody>
       </p:sp>
     </p:spTree>
-    <p:extLst>
-      <p:ext uri="{BB962C8B-B14F-4D97-AF65-F5344CB8AC3E}">
-        <p14:creationId xmlns:p14="http://schemas.microsoft.com/office/powerpoint/2010/main" val="1407465213"/>
-      </p:ext>
-    </p:extLst>
   </p:cSld>
   <p:clrMapOvr>
     <a:masterClrMapping/>
@@ -9853,6 +10026,7 @@
               <a:rPr lang="en-US" sz="3200" b="1" dirty="0"/>
               <a:t>Project Purpose or Justification</a:t>
             </a:r>
+            <a:endParaRPr lang="en-US" sz="3200" b="1" dirty="0"/>
           </a:p>
           <a:p>
             <a:pPr marL="0" indent="0" algn="just">
@@ -9862,6 +10036,7 @@
               <a:rPr lang="en-US" sz="3200" dirty="0"/>
               <a:t>•	Explains why the project is being undertaken.</a:t>
             </a:r>
+            <a:endParaRPr lang="en-US" sz="3200" dirty="0"/>
           </a:p>
           <a:p>
             <a:pPr marL="0" indent="0" algn="just">
@@ -9871,6 +10046,7 @@
               <a:rPr lang="en-US" sz="3200" dirty="0"/>
               <a:t>•	Defines how the project aligns with business objectives or solves a problem.</a:t>
             </a:r>
+            <a:endParaRPr lang="en-US" sz="3200" dirty="0"/>
           </a:p>
           <a:p>
             <a:pPr marL="0" indent="0" algn="just">
@@ -9880,6 +10056,7 @@
               <a:rPr lang="en-US" sz="3200" dirty="0"/>
               <a:t>•	Example: "This project aims to automate manual data entry, reducing errors and increasing efficiency by 30%."</a:t>
             </a:r>
+            <a:endParaRPr lang="en-US" sz="3200" dirty="0"/>
           </a:p>
           <a:p>
             <a:pPr algn="just"/>
@@ -9891,6 +10068,7 @@
               <a:rPr lang="en-US" sz="3200" b="1" dirty="0"/>
               <a:t>Measurable Project Objectives and Success Criteria</a:t>
             </a:r>
+            <a:endParaRPr lang="en-US" sz="3200" b="1" dirty="0"/>
           </a:p>
           <a:p>
             <a:pPr marL="0" indent="0" algn="just">
@@ -9900,6 +10078,7 @@
               <a:rPr lang="en-US" sz="3200" dirty="0"/>
               <a:t>•	Specifies clear and measurable goals.</a:t>
             </a:r>
+            <a:endParaRPr lang="en-US" sz="3200" dirty="0"/>
           </a:p>
           <a:p>
             <a:pPr marL="0" indent="0" algn="just">
@@ -9909,6 +10088,7 @@
               <a:rPr lang="en-US" sz="3200" dirty="0"/>
               <a:t>•	Defines how project success will be evaluated.</a:t>
             </a:r>
+            <a:endParaRPr lang="en-US" sz="3200" dirty="0"/>
           </a:p>
           <a:p>
             <a:pPr marL="0" indent="0" algn="just">
@@ -9918,6 +10098,7 @@
               <a:rPr lang="en-US" sz="3200" dirty="0"/>
               <a:t>•	Uses SMART Criteria (Specific, Measurable, Achievable, Relevant, Time-bound).</a:t>
             </a:r>
+            <a:endParaRPr lang="en-US" sz="3200" dirty="0"/>
           </a:p>
           <a:p>
             <a:pPr marL="0" indent="0" algn="just">
@@ -9927,6 +10108,7 @@
               <a:rPr lang="en-US" sz="3200" dirty="0"/>
               <a:t>•	Example: "The project will deliver a functional e-commerce website within six months, staying within a $500,000 budget</a:t>
             </a:r>
+            <a:endParaRPr lang="en-US" sz="3200" dirty="0"/>
           </a:p>
           <a:p>
             <a:pPr algn="just"/>
@@ -9935,11 +10117,6 @@
         </p:txBody>
       </p:sp>
     </p:spTree>
-    <p:extLst>
-      <p:ext uri="{BB962C8B-B14F-4D97-AF65-F5344CB8AC3E}">
-        <p14:creationId xmlns:p14="http://schemas.microsoft.com/office/powerpoint/2010/main" val="518140417"/>
-      </p:ext>
-    </p:extLst>
   </p:cSld>
   <p:clrMapOvr>
     <a:masterClrMapping/>
@@ -10031,6 +10208,7 @@
               <a:rPr lang="en-US" sz="3200" b="1" dirty="0"/>
               <a:t>High-Level Project Scope</a:t>
             </a:r>
+            <a:endParaRPr lang="en-US" sz="3200" b="1" dirty="0"/>
           </a:p>
           <a:p>
             <a:pPr marL="0" indent="0" algn="just">
@@ -10040,6 +10218,7 @@
               <a:rPr lang="en-US" sz="3200" dirty="0"/>
               <a:t>•	Outlines what the project will and will not include (In-Scope vs. Out-of-Scope).</a:t>
             </a:r>
+            <a:endParaRPr lang="en-US" sz="3200" dirty="0"/>
           </a:p>
           <a:p>
             <a:pPr marL="0" indent="0" algn="just">
@@ -10049,6 +10228,7 @@
               <a:rPr lang="en-US" sz="3200" dirty="0"/>
               <a:t>•	Helps prevent scope creep (uncontrolled changes or expansion).</a:t>
             </a:r>
+            <a:endParaRPr lang="en-US" sz="3200" dirty="0"/>
           </a:p>
           <a:p>
             <a:pPr marL="0" indent="0" algn="just">
@@ -10058,6 +10238,7 @@
               <a:rPr lang="en-US" sz="3200" dirty="0"/>
               <a:t>•	Example: "The project includes designing a new website but does not cover ongoing website maintenance."</a:t>
             </a:r>
+            <a:endParaRPr lang="en-US" sz="3200" dirty="0"/>
           </a:p>
           <a:p>
             <a:pPr marL="0" indent="0" algn="just">
@@ -10075,6 +10256,7 @@
               <a:rPr lang="en-US" sz="3200" b="1" dirty="0"/>
               <a:t>High-Level Requirements</a:t>
             </a:r>
+            <a:endParaRPr lang="en-US" sz="3200" b="1" dirty="0"/>
           </a:p>
           <a:p>
             <a:pPr marL="0" indent="0" algn="just">
@@ -10084,6 +10266,7 @@
               <a:rPr lang="en-US" sz="3200" dirty="0"/>
               <a:t>•	Identifies major business or technical requirements.</a:t>
             </a:r>
+            <a:endParaRPr lang="en-US" sz="3200" dirty="0"/>
           </a:p>
           <a:p>
             <a:pPr marL="0" indent="0" algn="just">
@@ -10093,6 +10276,7 @@
               <a:rPr lang="en-US" sz="3200" dirty="0"/>
               <a:t>•	Provides an overview of essential features or deliverables.</a:t>
             </a:r>
+            <a:endParaRPr lang="en-US" sz="3200" dirty="0"/>
           </a:p>
           <a:p>
             <a:pPr marL="0" indent="0" algn="just">
@@ -10102,15 +10286,11 @@
               <a:rPr lang="en-US" sz="3200" dirty="0"/>
               <a:t>•	Example: "The system must support 1,000 concurrent users and integrate with the company’s existing CRM."</a:t>
             </a:r>
+            <a:endParaRPr lang="en-US" sz="3200" dirty="0"/>
           </a:p>
         </p:txBody>
       </p:sp>
     </p:spTree>
-    <p:extLst>
-      <p:ext uri="{BB962C8B-B14F-4D97-AF65-F5344CB8AC3E}">
-        <p14:creationId xmlns:p14="http://schemas.microsoft.com/office/powerpoint/2010/main" val="3423468372"/>
-      </p:ext>
-    </p:extLst>
   </p:cSld>
   <p:clrMapOvr>
     <a:masterClrMapping/>
@@ -10208,6 +10388,7 @@
               <a:rPr lang="en-US" sz="3200" b="1" dirty="0"/>
               <a:t>Assumptions and Constraints</a:t>
             </a:r>
+            <a:endParaRPr lang="en-US" sz="3200" b="1" dirty="0"/>
           </a:p>
           <a:p>
             <a:pPr marL="0" indent="0" algn="just">
@@ -10217,6 +10398,7 @@
               <a:rPr lang="en-US" sz="3200" dirty="0"/>
               <a:t>•	Assumptions: Conditions considered true for planning but not yet proven.</a:t>
             </a:r>
+            <a:endParaRPr lang="en-US" sz="3200" dirty="0"/>
           </a:p>
           <a:p>
             <a:pPr marL="0" indent="0" algn="just">
@@ -10226,6 +10408,7 @@
               <a:rPr lang="en-US" sz="3200" dirty="0"/>
               <a:t>•	Constraints: Limitations such as budget, time, resources, or regulations.</a:t>
             </a:r>
+            <a:endParaRPr lang="en-US" sz="3200" dirty="0"/>
           </a:p>
           <a:p>
             <a:pPr marL="0" indent="0" algn="just">
@@ -10235,6 +10418,7 @@
               <a:rPr lang="en-US" sz="3200" dirty="0"/>
               <a:t>•	Example:</a:t>
             </a:r>
+            <a:endParaRPr lang="en-US" sz="3200" dirty="0"/>
           </a:p>
           <a:p>
             <a:pPr marL="0" indent="0" algn="just">
@@ -10244,6 +10428,7 @@
               <a:rPr lang="en-US" sz="3200" dirty="0"/>
               <a:t>	Assumption: "The client will provide timely feedback within 48 hours."</a:t>
             </a:r>
+            <a:endParaRPr lang="en-US" sz="3200" dirty="0"/>
           </a:p>
           <a:p>
             <a:pPr marL="0" indent="0" algn="just">
@@ -10261,6 +10446,7 @@
               <a:rPr lang="en-US" sz="3200" dirty="0"/>
               <a:t>: "The project must be completed within a $1M budget and by December 31, 2025."</a:t>
             </a:r>
+            <a:endParaRPr lang="en-US" sz="3200" dirty="0"/>
           </a:p>
           <a:p>
             <a:pPr algn="just"/>
@@ -10272,6 +10458,7 @@
               <a:rPr lang="en-US" sz="3200" b="1" dirty="0"/>
               <a:t>Project Risks</a:t>
             </a:r>
+            <a:endParaRPr lang="en-US" sz="3200" b="1" dirty="0"/>
           </a:p>
           <a:p>
             <a:pPr marL="0" indent="0" algn="just">
@@ -10281,6 +10468,7 @@
               <a:rPr lang="en-US" sz="3200" dirty="0"/>
               <a:t>•	Identifies high-level risks that could impact the project.</a:t>
             </a:r>
+            <a:endParaRPr lang="en-US" sz="3200" dirty="0"/>
           </a:p>
           <a:p>
             <a:pPr marL="0" indent="0" algn="just">
@@ -10290,6 +10478,7 @@
               <a:rPr lang="en-US" sz="3200" dirty="0"/>
               <a:t>•	Example: "A key risk is supplier delays, which could impact the project timeline."</a:t>
             </a:r>
+            <a:endParaRPr lang="en-US" sz="3200" dirty="0"/>
           </a:p>
           <a:p>
             <a:pPr marL="0" indent="0" algn="just">
@@ -10300,11 +10489,6 @@
         </p:txBody>
       </p:sp>
     </p:spTree>
-    <p:extLst>
-      <p:ext uri="{BB962C8B-B14F-4D97-AF65-F5344CB8AC3E}">
-        <p14:creationId xmlns:p14="http://schemas.microsoft.com/office/powerpoint/2010/main" val="3180346477"/>
-      </p:ext>
-    </p:extLst>
   </p:cSld>
   <p:clrMapOvr>
     <a:masterClrMapping/>
@@ -10402,6 +10586,7 @@
               <a:rPr lang="en-US" sz="3200" b="1" dirty="0"/>
               <a:t>Milestones and Timeline</a:t>
             </a:r>
+            <a:endParaRPr lang="en-US" sz="3200" b="1" dirty="0"/>
           </a:p>
           <a:p>
             <a:pPr marL="0" indent="0" algn="just">
@@ -10411,6 +10596,7 @@
               <a:rPr lang="en-US" sz="3200" dirty="0"/>
               <a:t>•	Lists major phases or significant events with estimated dates.</a:t>
             </a:r>
+            <a:endParaRPr lang="en-US" sz="3200" dirty="0"/>
           </a:p>
           <a:p>
             <a:pPr marL="0" indent="0" algn="just">
@@ -10420,6 +10606,7 @@
               <a:rPr lang="en-US" sz="3200" dirty="0"/>
               <a:t>•	Example:</a:t>
             </a:r>
+            <a:endParaRPr lang="en-US" sz="3200" dirty="0"/>
           </a:p>
           <a:p>
             <a:pPr marL="0" indent="0" algn="just">
@@ -10433,6 +10620,7 @@
               <a:rPr lang="en-US" sz="3200" dirty="0"/>
               <a:t>Milestone	Expected Date</a:t>
             </a:r>
+            <a:endParaRPr lang="en-US" sz="3200" dirty="0"/>
           </a:p>
           <a:p>
             <a:pPr marL="0" indent="0" algn="just">
@@ -10442,6 +10630,7 @@
               <a:rPr lang="en-US" sz="3200" dirty="0"/>
               <a:t>Project Kickoff	April 10, 2025</a:t>
             </a:r>
+            <a:endParaRPr lang="en-US" sz="3200" dirty="0"/>
           </a:p>
           <a:p>
             <a:pPr marL="0" indent="0" algn="just">
@@ -10451,6 +10640,7 @@
               <a:rPr lang="en-US" sz="3200" dirty="0"/>
               <a:t>Prototype Development Complete	July 20, 2025</a:t>
             </a:r>
+            <a:endParaRPr lang="en-US" sz="3200" dirty="0"/>
           </a:p>
           <a:p>
             <a:pPr marL="0" indent="0" algn="just">
@@ -10460,6 +10650,7 @@
               <a:rPr lang="en-US" sz="3200" dirty="0"/>
               <a:t>Final Testing &amp; Deployment	December 1, 2025</a:t>
             </a:r>
+            <a:endParaRPr lang="en-US" sz="3200" dirty="0"/>
           </a:p>
           <a:p>
             <a:pPr algn="just"/>
@@ -10471,6 +10662,7 @@
               <a:rPr lang="en-US" sz="3200" b="1" dirty="0"/>
               <a:t>Budget Summary</a:t>
             </a:r>
+            <a:endParaRPr lang="en-US" sz="3200" b="1" dirty="0"/>
           </a:p>
           <a:p>
             <a:pPr marL="0" indent="0" algn="just">
@@ -10480,6 +10672,7 @@
               <a:rPr lang="en-US" sz="3200" dirty="0"/>
               <a:t>•	Provides an estimated budget range or allocation.</a:t>
             </a:r>
+            <a:endParaRPr lang="en-US" sz="3200" dirty="0"/>
           </a:p>
           <a:p>
             <a:pPr marL="0" indent="0" algn="just">
@@ -10489,15 +10682,11 @@
               <a:rPr lang="en-US" sz="3200" dirty="0"/>
               <a:t>•	Example: "The project has a budget of $500,000, with 40% allocated to development and 20% to testing."</a:t>
             </a:r>
+            <a:endParaRPr lang="en-US" sz="3200" dirty="0"/>
           </a:p>
         </p:txBody>
       </p:sp>
     </p:spTree>
-    <p:extLst>
-      <p:ext uri="{BB962C8B-B14F-4D97-AF65-F5344CB8AC3E}">
-        <p14:creationId xmlns:p14="http://schemas.microsoft.com/office/powerpoint/2010/main" val="716326171"/>
-      </p:ext>
-    </p:extLst>
   </p:cSld>
   <p:clrMapOvr>
     <a:masterClrMapping/>
@@ -10591,6 +10780,7 @@
               <a:rPr lang="en-US" sz="3200" b="1" dirty="0"/>
               <a:t>Key Stakeholders</a:t>
             </a:r>
+            <a:endParaRPr lang="en-US" sz="3200" b="1" dirty="0"/>
           </a:p>
           <a:p>
             <a:pPr marL="0" indent="0" algn="just">
@@ -10600,6 +10790,7 @@
               <a:rPr lang="en-US" sz="3200" dirty="0"/>
               <a:t>•	Identifies key individuals or groups with interest or influence over the project.</a:t>
             </a:r>
+            <a:endParaRPr lang="en-US" sz="3200" dirty="0"/>
           </a:p>
           <a:p>
             <a:pPr marL="0" indent="0" algn="just">
@@ -10613,6 +10804,7 @@
               <a:rPr lang="en-US" sz="3200" dirty="0" smtClean="0"/>
               <a:t>:</a:t>
             </a:r>
+            <a:endParaRPr lang="en-US" sz="3200" dirty="0" smtClean="0"/>
           </a:p>
           <a:p>
             <a:pPr marL="0" indent="0" algn="just">
@@ -10658,6 +10850,7 @@
               <a:rPr lang="en-US" sz="3200" b="1" dirty="0"/>
               <a:t>Project Manager and Authority Level</a:t>
             </a:r>
+            <a:endParaRPr lang="en-US" sz="3200" b="1" dirty="0"/>
           </a:p>
           <a:p>
             <a:pPr marL="0" indent="0" algn="just">
@@ -10667,6 +10860,7 @@
               <a:rPr lang="en-US" sz="3200" dirty="0"/>
               <a:t>•	Names the Project Manager and defines their level of authority.</a:t>
             </a:r>
+            <a:endParaRPr lang="en-US" sz="3200" dirty="0"/>
           </a:p>
           <a:p>
             <a:pPr marL="0" indent="0" algn="just">
@@ -10680,6 +10874,7 @@
               <a:rPr lang="en-US" sz="3200" dirty="0" smtClean="0"/>
               <a:t>.“</a:t>
             </a:r>
+            <a:endParaRPr lang="en-US" sz="3200" dirty="0" smtClean="0"/>
           </a:p>
           <a:p>
             <a:pPr marL="0" indent="0" algn="just">
@@ -10693,6 +10888,7 @@
               <a:rPr lang="en-US" sz="3200" b="1" dirty="0"/>
               <a:t>Approval and Authorization</a:t>
             </a:r>
+            <a:endParaRPr lang="en-US" sz="3200" b="1" dirty="0"/>
           </a:p>
           <a:p>
             <a:pPr marL="0" indent="0" algn="just">
@@ -10702,6 +10898,7 @@
               <a:rPr lang="en-US" sz="3200" dirty="0"/>
               <a:t>•	Contains signatures from key decision-makers (e.g., sponsor, steering committee).</a:t>
             </a:r>
+            <a:endParaRPr lang="en-US" sz="3200" dirty="0"/>
           </a:p>
           <a:p>
             <a:pPr marL="0" indent="0" algn="just">
@@ -10711,6 +10908,7 @@
               <a:rPr lang="en-US" sz="3200" dirty="0"/>
               <a:t>•	Officially authorizes the project and grants authority to the project manager</a:t>
             </a:r>
+            <a:endParaRPr lang="en-US" sz="3200" dirty="0"/>
           </a:p>
           <a:p>
             <a:pPr marL="0" indent="0" algn="just">
@@ -10736,13 +10934,7 @@
           <p:cNvGraphicFramePr>
             <a:graphicFrameLocks noGrp="1"/>
           </p:cNvGraphicFramePr>
-          <p:nvPr>
-            <p:extLst>
-              <p:ext uri="{D42A27DB-BD31-4B8C-83A1-F6EECF244321}">
-                <p14:modId xmlns:p14="http://schemas.microsoft.com/office/powerpoint/2010/main" val="1995720577"/>
-              </p:ext>
-            </p:extLst>
-          </p:nvPr>
+          <p:nvPr/>
         </p:nvGraphicFramePr>
         <p:xfrm>
           <a:off x="1968500" y="2362200"/>
@@ -10822,13 +11014,13 @@
                         <a:buSzTx/>
                         <a:buFontTx/>
                         <a:buNone/>
-                        <a:tabLst/>
                         <a:defRPr/>
                       </a:pPr>
                       <a:r>
                         <a:rPr lang="en-US" sz="1800" b="1" dirty="0" smtClean="0"/>
                         <a:t>Influence Level</a:t>
                       </a:r>
+                      <a:endParaRPr lang="en-US" sz="1800" b="1" dirty="0" smtClean="0"/>
                     </a:p>
                     <a:p>
                       <a:endParaRPr lang="en-US" dirty="0"/>
@@ -10966,11 +11158,6 @@
         </a:graphic>
       </p:graphicFrame>
     </p:spTree>
-    <p:extLst>
-      <p:ext uri="{BB962C8B-B14F-4D97-AF65-F5344CB8AC3E}">
-        <p14:creationId xmlns:p14="http://schemas.microsoft.com/office/powerpoint/2010/main" val="2349365335"/>
-      </p:ext>
-    </p:extLst>
   </p:cSld>
   <p:clrMapOvr>
     <a:masterClrMapping/>
@@ -11028,7 +11215,7 @@
     </a:clrScheme>
     <a:fontScheme name="Wisp">
       <a:majorFont>
-        <a:latin typeface="Century Gothic" panose="020B0502020202020204"/>
+        <a:latin typeface="Century Gothic"/>
         <a:ea typeface=""/>
         <a:cs typeface=""/>
         <a:font script="Jpan" typeface="メイリオ"/>
@@ -11063,7 +11250,7 @@
         <a:font script="Geor" typeface="Sylfaen"/>
       </a:majorFont>
       <a:minorFont>
-        <a:latin typeface="Century Gothic" panose="020B0502020202020204"/>
+        <a:latin typeface="Century Gothic"/>
         <a:ea typeface=""/>
         <a:cs typeface=""/>
         <a:font script="Jpan" typeface="メイリオ"/>
@@ -11218,11 +11405,9 @@
       </a:bgFillStyleLst>
     </a:fmtScheme>
   </a:themeElements>
-  <a:objectDefaults/>
-  <a:extraClrSchemeLst/>
   <a:extLst>
     <a:ext uri="{05A4C25C-085E-4340-85A3-A5531E510DB2}">
-      <thm15:themeFamily xmlns:thm15="http://schemas.microsoft.com/office/thememl/2012/main" xmlns="" name="Wisp" id="{7CB32D59-10C0-40DD-B7BD-2E94284A981C}" vid="{24B1A44C-C006-48B2-A4D7-E5549B3D8CD4}"/>
+      <thm15:themeFamily xmlns:thm15="http://schemas.microsoft.com/office/thememl/2012/main" name="Office Theme" id="{62F939B6-93AF-4DB8-9C6B-D6C7DFDC589F}" vid="{4A3C46E8-61CC-4603-A589-7422A47A8E4A}"/>
     </a:ext>
   </a:extLst>
 </a:theme>

</xml_diff>